<commit_message>
Added code and complete slides
</commit_message>
<xml_diff>
--- a/Crash Course Slides.pptx
+++ b/Crash Course Slides.pptx
@@ -7,6 +7,37 @@
   <p:sldIdLst>
     <p:sldId id="256" r:id="rId2"/>
     <p:sldId id="257" r:id="rId3"/>
+    <p:sldId id="258" r:id="rId4"/>
+    <p:sldId id="260" r:id="rId5"/>
+    <p:sldId id="261" r:id="rId6"/>
+    <p:sldId id="262" r:id="rId7"/>
+    <p:sldId id="263" r:id="rId8"/>
+    <p:sldId id="264" r:id="rId9"/>
+    <p:sldId id="265" r:id="rId10"/>
+    <p:sldId id="266" r:id="rId11"/>
+    <p:sldId id="267" r:id="rId12"/>
+    <p:sldId id="268" r:id="rId13"/>
+    <p:sldId id="259" r:id="rId14"/>
+    <p:sldId id="269" r:id="rId15"/>
+    <p:sldId id="270" r:id="rId16"/>
+    <p:sldId id="271" r:id="rId17"/>
+    <p:sldId id="272" r:id="rId18"/>
+    <p:sldId id="273" r:id="rId19"/>
+    <p:sldId id="274" r:id="rId20"/>
+    <p:sldId id="275" r:id="rId21"/>
+    <p:sldId id="276" r:id="rId22"/>
+    <p:sldId id="277" r:id="rId23"/>
+    <p:sldId id="278" r:id="rId24"/>
+    <p:sldId id="279" r:id="rId25"/>
+    <p:sldId id="280" r:id="rId26"/>
+    <p:sldId id="281" r:id="rId27"/>
+    <p:sldId id="282" r:id="rId28"/>
+    <p:sldId id="283" r:id="rId29"/>
+    <p:sldId id="284" r:id="rId30"/>
+    <p:sldId id="285" r:id="rId31"/>
+    <p:sldId id="286" r:id="rId32"/>
+    <p:sldId id="287" r:id="rId33"/>
+    <p:sldId id="288" r:id="rId34"/>
   </p:sldIdLst>
   <p:sldSz cx="9144000" cy="6858000" type="screen4x3"/>
   <p:notesSz cx="6858000" cy="9144000"/>
@@ -3808,6 +3839,1342 @@
   <p:clrMapOvr>
     <a:masterClrMapping/>
   </p:clrMapOvr>
+  <p:timing>
+    <p:tnLst>
+      <p:par>
+        <p:cTn xmlns:p14="http://schemas.microsoft.com/office/powerpoint/2010/main" id="1" dur="indefinite" restart="never" nodeType="tmRoot"/>
+      </p:par>
+    </p:tnLst>
+  </p:timing>
+</p:sld>
+</file>
+
+<file path=ppt/slides/slide10.xml><?xml version="1.0" encoding="utf-8"?>
+<p:sld xmlns:a="http://schemas.openxmlformats.org/drawingml/2006/main" xmlns:r="http://schemas.openxmlformats.org/officeDocument/2006/relationships" xmlns:p="http://schemas.openxmlformats.org/presentationml/2006/main">
+  <p:cSld>
+    <p:spTree>
+      <p:nvGrpSpPr>
+        <p:cNvPr id="1" name=""/>
+        <p:cNvGrpSpPr/>
+        <p:nvPr/>
+      </p:nvGrpSpPr>
+      <p:grpSpPr>
+        <a:xfrm>
+          <a:off x="0" y="0"/>
+          <a:ext cx="0" cy="0"/>
+          <a:chOff x="0" y="0"/>
+          <a:chExt cx="0" cy="0"/>
+        </a:xfrm>
+      </p:grpSpPr>
+      <p:sp>
+        <p:nvSpPr>
+          <p:cNvPr id="2" name="Title 1"/>
+          <p:cNvSpPr>
+            <a:spLocks noGrp="1"/>
+          </p:cNvSpPr>
+          <p:nvPr>
+            <p:ph type="title"/>
+          </p:nvPr>
+        </p:nvSpPr>
+        <p:spPr/>
+        <p:txBody>
+          <a:bodyPr/>
+          <a:lstStyle/>
+          <a:p>
+            <a:r>
+              <a:rPr lang="en-US" dirty="0" smtClean="0"/>
+              <a:t>Pointers Cont.</a:t>
+            </a:r>
+            <a:endParaRPr lang="en-US" dirty="0"/>
+          </a:p>
+        </p:txBody>
+      </p:sp>
+      <p:sp>
+        <p:nvSpPr>
+          <p:cNvPr id="3" name="Content Placeholder 2"/>
+          <p:cNvSpPr>
+            <a:spLocks noGrp="1"/>
+          </p:cNvSpPr>
+          <p:nvPr>
+            <p:ph idx="1"/>
+          </p:nvPr>
+        </p:nvSpPr>
+        <p:spPr>
+          <a:xfrm>
+            <a:off x="779462" y="1882587"/>
+            <a:ext cx="7581901" cy="4320359"/>
+          </a:xfrm>
+        </p:spPr>
+        <p:txBody>
+          <a:bodyPr/>
+          <a:lstStyle/>
+          <a:p>
+            <a:r>
+              <a:rPr lang="en-US" dirty="0" smtClean="0"/>
+              <a:t>Why do we need pointers?</a:t>
+            </a:r>
+          </a:p>
+          <a:p>
+            <a:pPr lvl="1"/>
+            <a:r>
+              <a:rPr lang="en-US" dirty="0" smtClean="0"/>
+              <a:t>Its simple. If we don’t know where something is in the vastly large 3D-space it gets lost and stays there for all eternity (or at least until your computer shuts down) or it is replaced. Depending on where in memory it is located.</a:t>
+            </a:r>
+          </a:p>
+          <a:p>
+            <a:pPr lvl="1"/>
+            <a:r>
+              <a:rPr lang="en-US" dirty="0" smtClean="0"/>
+              <a:t>We basically just don’t know where to get our variables</a:t>
+            </a:r>
+          </a:p>
+          <a:p>
+            <a:pPr lvl="1"/>
+            <a:r>
+              <a:rPr lang="en-US" dirty="0" smtClean="0"/>
+              <a:t>Pointers are very useful for Complex Data Types (classes). More about Pointers in COS 110.</a:t>
+            </a:r>
+          </a:p>
+          <a:p>
+            <a:pPr lvl="1"/>
+            <a:endParaRPr lang="en-US" dirty="0"/>
+          </a:p>
+        </p:txBody>
+      </p:sp>
+    </p:spTree>
+    <p:extLst>
+      <p:ext uri="{BB962C8B-B14F-4D97-AF65-F5344CB8AC3E}">
+        <p14:creationId xmlns:p14="http://schemas.microsoft.com/office/powerpoint/2010/main" val="702380243"/>
+      </p:ext>
+    </p:extLst>
+  </p:cSld>
+  <p:clrMapOvr>
+    <a:masterClrMapping/>
+  </p:clrMapOvr>
+  <p:timing>
+    <p:tnLst>
+      <p:par>
+        <p:cTn xmlns:p14="http://schemas.microsoft.com/office/powerpoint/2010/main" id="1" dur="indefinite" restart="never" nodeType="tmRoot"/>
+      </p:par>
+    </p:tnLst>
+  </p:timing>
+</p:sld>
+</file>
+
+<file path=ppt/slides/slide11.xml><?xml version="1.0" encoding="utf-8"?>
+<p:sld xmlns:a="http://schemas.openxmlformats.org/drawingml/2006/main" xmlns:r="http://schemas.openxmlformats.org/officeDocument/2006/relationships" xmlns:p="http://schemas.openxmlformats.org/presentationml/2006/main">
+  <p:cSld>
+    <p:spTree>
+      <p:nvGrpSpPr>
+        <p:cNvPr id="1" name=""/>
+        <p:cNvGrpSpPr/>
+        <p:nvPr/>
+      </p:nvGrpSpPr>
+      <p:grpSpPr>
+        <a:xfrm>
+          <a:off x="0" y="0"/>
+          <a:ext cx="0" cy="0"/>
+          <a:chOff x="0" y="0"/>
+          <a:chExt cx="0" cy="0"/>
+        </a:xfrm>
+      </p:grpSpPr>
+      <p:sp>
+        <p:nvSpPr>
+          <p:cNvPr id="2" name="Title 1"/>
+          <p:cNvSpPr>
+            <a:spLocks noGrp="1"/>
+          </p:cNvSpPr>
+          <p:nvPr>
+            <p:ph type="title"/>
+          </p:nvPr>
+        </p:nvSpPr>
+        <p:spPr/>
+        <p:txBody>
+          <a:bodyPr/>
+          <a:lstStyle/>
+          <a:p>
+            <a:r>
+              <a:rPr lang="en-US" dirty="0" smtClean="0"/>
+              <a:t>Pointers</a:t>
+            </a:r>
+            <a:endParaRPr lang="en-US" dirty="0"/>
+          </a:p>
+        </p:txBody>
+      </p:sp>
+      <p:sp>
+        <p:nvSpPr>
+          <p:cNvPr id="3" name="Content Placeholder 2"/>
+          <p:cNvSpPr>
+            <a:spLocks noGrp="1"/>
+          </p:cNvSpPr>
+          <p:nvPr>
+            <p:ph idx="1"/>
+          </p:nvPr>
+        </p:nvSpPr>
+        <p:spPr/>
+        <p:txBody>
+          <a:bodyPr/>
+          <a:lstStyle/>
+          <a:p>
+            <a:r>
+              <a:rPr lang="en-US" dirty="0" smtClean="0"/>
+              <a:t>How do I use pointers?</a:t>
+            </a:r>
+          </a:p>
+          <a:p>
+            <a:pPr lvl="1"/>
+            <a:r>
+              <a:rPr lang="en-US" dirty="0" smtClean="0"/>
+              <a:t>If assigning a value to a pointer which is not an address. Use the keyword </a:t>
+            </a:r>
+            <a:r>
+              <a:rPr lang="en-US" i="1" dirty="0" smtClean="0">
+                <a:solidFill>
+                  <a:schemeClr val="accent4"/>
+                </a:solidFill>
+              </a:rPr>
+              <a:t>new</a:t>
+            </a:r>
+            <a:endParaRPr lang="en-US" dirty="0" smtClean="0">
+              <a:solidFill>
+                <a:schemeClr val="accent4"/>
+              </a:solidFill>
+            </a:endParaRPr>
+          </a:p>
+          <a:p>
+            <a:pPr lvl="2"/>
+            <a:r>
+              <a:rPr lang="en-US" i="1" dirty="0" smtClean="0"/>
+              <a:t>Example:	</a:t>
+            </a:r>
+            <a:r>
+              <a:rPr lang="en-US" i="1" dirty="0" err="1" smtClean="0">
+                <a:latin typeface="Apple Chancery"/>
+                <a:cs typeface="Apple Chancery"/>
+              </a:rPr>
+              <a:t>P.cpp</a:t>
+            </a:r>
+            <a:endParaRPr lang="en-US" i="1" dirty="0">
+              <a:latin typeface="Apple Chancery"/>
+              <a:cs typeface="Apple Chancery"/>
+            </a:endParaRPr>
+          </a:p>
+          <a:p>
+            <a:pPr lvl="1"/>
+            <a:r>
+              <a:rPr lang="en-US" dirty="0" smtClean="0">
+                <a:cs typeface="Apple Chancery"/>
+              </a:rPr>
+              <a:t>Remember the difference between a reference and an actual piece of data</a:t>
+            </a:r>
+          </a:p>
+        </p:txBody>
+      </p:sp>
+    </p:spTree>
+    <p:extLst>
+      <p:ext uri="{BB962C8B-B14F-4D97-AF65-F5344CB8AC3E}">
+        <p14:creationId xmlns:p14="http://schemas.microsoft.com/office/powerpoint/2010/main" val="577293121"/>
+      </p:ext>
+    </p:extLst>
+  </p:cSld>
+  <p:clrMapOvr>
+    <a:masterClrMapping/>
+  </p:clrMapOvr>
+  <p:timing>
+    <p:tnLst>
+      <p:par>
+        <p:cTn xmlns:p14="http://schemas.microsoft.com/office/powerpoint/2010/main" id="1" dur="indefinite" restart="never" nodeType="tmRoot"/>
+      </p:par>
+    </p:tnLst>
+  </p:timing>
+</p:sld>
+</file>
+
+<file path=ppt/slides/slide12.xml><?xml version="1.0" encoding="utf-8"?>
+<p:sld xmlns:a="http://schemas.openxmlformats.org/drawingml/2006/main" xmlns:r="http://schemas.openxmlformats.org/officeDocument/2006/relationships" xmlns:p="http://schemas.openxmlformats.org/presentationml/2006/main">
+  <p:cSld>
+    <p:spTree>
+      <p:nvGrpSpPr>
+        <p:cNvPr id="1" name=""/>
+        <p:cNvGrpSpPr/>
+        <p:nvPr/>
+      </p:nvGrpSpPr>
+      <p:grpSpPr>
+        <a:xfrm>
+          <a:off x="0" y="0"/>
+          <a:ext cx="0" cy="0"/>
+          <a:chOff x="0" y="0"/>
+          <a:chExt cx="0" cy="0"/>
+        </a:xfrm>
+      </p:grpSpPr>
+      <p:sp>
+        <p:nvSpPr>
+          <p:cNvPr id="2" name="Title 1"/>
+          <p:cNvSpPr>
+            <a:spLocks noGrp="1"/>
+          </p:cNvSpPr>
+          <p:nvPr>
+            <p:ph type="title"/>
+          </p:nvPr>
+        </p:nvSpPr>
+        <p:spPr/>
+        <p:txBody>
+          <a:bodyPr/>
+          <a:lstStyle/>
+          <a:p>
+            <a:r>
+              <a:rPr lang="en-US" dirty="0" smtClean="0"/>
+              <a:t>Pointer Cont.</a:t>
+            </a:r>
+            <a:endParaRPr lang="en-US" dirty="0"/>
+          </a:p>
+        </p:txBody>
+      </p:sp>
+      <p:sp>
+        <p:nvSpPr>
+          <p:cNvPr id="3" name="Content Placeholder 2"/>
+          <p:cNvSpPr>
+            <a:spLocks noGrp="1"/>
+          </p:cNvSpPr>
+          <p:nvPr>
+            <p:ph idx="1"/>
+          </p:nvPr>
+        </p:nvSpPr>
+        <p:spPr/>
+        <p:txBody>
+          <a:bodyPr/>
+          <a:lstStyle/>
+          <a:p>
+            <a:r>
+              <a:rPr lang="en-US" dirty="0" smtClean="0"/>
+              <a:t>Good news:</a:t>
+            </a:r>
+          </a:p>
+          <a:p>
+            <a:pPr lvl="1"/>
+            <a:r>
+              <a:rPr lang="en-US" dirty="0" smtClean="0"/>
+              <a:t>That’s almost it for pointers! If you understand this part, the next part of using them should be very easy.</a:t>
+            </a:r>
+          </a:p>
+          <a:p>
+            <a:r>
+              <a:rPr lang="en-US" dirty="0" smtClean="0"/>
+              <a:t>Bad news:</a:t>
+            </a:r>
+          </a:p>
+          <a:p>
+            <a:pPr lvl="1"/>
+            <a:r>
+              <a:rPr lang="en-US" dirty="0" smtClean="0"/>
+              <a:t>If you are continuing on with COS 110 and COS 121, be prepared. Be very prepared.</a:t>
+            </a:r>
+          </a:p>
+        </p:txBody>
+      </p:sp>
+    </p:spTree>
+    <p:extLst>
+      <p:ext uri="{BB962C8B-B14F-4D97-AF65-F5344CB8AC3E}">
+        <p14:creationId xmlns:p14="http://schemas.microsoft.com/office/powerpoint/2010/main" val="3284513223"/>
+      </p:ext>
+    </p:extLst>
+  </p:cSld>
+  <p:clrMapOvr>
+    <a:masterClrMapping/>
+  </p:clrMapOvr>
+  <p:timing>
+    <p:tnLst>
+      <p:par>
+        <p:cTn xmlns:p14="http://schemas.microsoft.com/office/powerpoint/2010/main" id="1" dur="indefinite" restart="never" nodeType="tmRoot"/>
+      </p:par>
+    </p:tnLst>
+  </p:timing>
+</p:sld>
+</file>
+
+<file path=ppt/slides/slide13.xml><?xml version="1.0" encoding="utf-8"?>
+<p:sld xmlns:a="http://schemas.openxmlformats.org/drawingml/2006/main" xmlns:r="http://schemas.openxmlformats.org/officeDocument/2006/relationships" xmlns:p="http://schemas.openxmlformats.org/presentationml/2006/main">
+  <p:cSld>
+    <p:spTree>
+      <p:nvGrpSpPr>
+        <p:cNvPr id="1" name=""/>
+        <p:cNvGrpSpPr/>
+        <p:nvPr/>
+      </p:nvGrpSpPr>
+      <p:grpSpPr>
+        <a:xfrm>
+          <a:off x="0" y="0"/>
+          <a:ext cx="0" cy="0"/>
+          <a:chOff x="0" y="0"/>
+          <a:chExt cx="0" cy="0"/>
+        </a:xfrm>
+      </p:grpSpPr>
+      <p:sp>
+        <p:nvSpPr>
+          <p:cNvPr id="2" name="Title 1"/>
+          <p:cNvSpPr>
+            <a:spLocks noGrp="1"/>
+          </p:cNvSpPr>
+          <p:nvPr>
+            <p:ph type="title"/>
+          </p:nvPr>
+        </p:nvSpPr>
+        <p:spPr/>
+        <p:txBody>
+          <a:bodyPr/>
+          <a:lstStyle/>
+          <a:p>
+            <a:r>
+              <a:rPr lang="en-US" dirty="0" smtClean="0"/>
+              <a:t>Arrays as Data Types</a:t>
+            </a:r>
+            <a:endParaRPr lang="en-US" dirty="0"/>
+          </a:p>
+        </p:txBody>
+      </p:sp>
+      <p:sp>
+        <p:nvSpPr>
+          <p:cNvPr id="3" name="Content Placeholder 2"/>
+          <p:cNvSpPr>
+            <a:spLocks noGrp="1"/>
+          </p:cNvSpPr>
+          <p:nvPr>
+            <p:ph idx="1"/>
+          </p:nvPr>
+        </p:nvSpPr>
+        <p:spPr/>
+        <p:txBody>
+          <a:bodyPr/>
+          <a:lstStyle/>
+          <a:p>
+            <a:r>
+              <a:rPr lang="en-US" dirty="0" smtClean="0"/>
+              <a:t>What is an Array?</a:t>
+            </a:r>
+          </a:p>
+          <a:p>
+            <a:r>
+              <a:rPr lang="en-US" dirty="0" smtClean="0"/>
+              <a:t> How do you use an Array?</a:t>
+            </a:r>
+          </a:p>
+          <a:p>
+            <a:endParaRPr lang="en-US" dirty="0"/>
+          </a:p>
+        </p:txBody>
+      </p:sp>
+      <p:pic>
+        <p:nvPicPr>
+          <p:cNvPr id="4" name="Picture 3"/>
+          <p:cNvPicPr>
+            <a:picLocks noChangeAspect="1"/>
+          </p:cNvPicPr>
+          <p:nvPr/>
+        </p:nvPicPr>
+        <p:blipFill>
+          <a:blip r:embed="rId2"/>
+          <a:stretch>
+            <a:fillRect/>
+          </a:stretch>
+        </p:blipFill>
+        <p:spPr>
+          <a:xfrm>
+            <a:off x="1711158" y="3143029"/>
+            <a:ext cx="5694947" cy="3194042"/>
+          </a:xfrm>
+          <a:prstGeom prst="rect">
+            <a:avLst/>
+          </a:prstGeom>
+        </p:spPr>
+      </p:pic>
+    </p:spTree>
+    <p:extLst>
+      <p:ext uri="{BB962C8B-B14F-4D97-AF65-F5344CB8AC3E}">
+        <p14:creationId xmlns:p14="http://schemas.microsoft.com/office/powerpoint/2010/main" val="350975909"/>
+      </p:ext>
+    </p:extLst>
+  </p:cSld>
+  <p:clrMapOvr>
+    <a:masterClrMapping/>
+  </p:clrMapOvr>
+  <p:timing>
+    <p:tnLst>
+      <p:par>
+        <p:cTn xmlns:p14="http://schemas.microsoft.com/office/powerpoint/2010/main" id="1" dur="indefinite" restart="never" nodeType="tmRoot"/>
+      </p:par>
+    </p:tnLst>
+  </p:timing>
+</p:sld>
+</file>
+
+<file path=ppt/slides/slide14.xml><?xml version="1.0" encoding="utf-8"?>
+<p:sld xmlns:a="http://schemas.openxmlformats.org/drawingml/2006/main" xmlns:r="http://schemas.openxmlformats.org/officeDocument/2006/relationships" xmlns:p="http://schemas.openxmlformats.org/presentationml/2006/main">
+  <p:cSld>
+    <p:spTree>
+      <p:nvGrpSpPr>
+        <p:cNvPr id="1" name=""/>
+        <p:cNvGrpSpPr/>
+        <p:nvPr/>
+      </p:nvGrpSpPr>
+      <p:grpSpPr>
+        <a:xfrm>
+          <a:off x="0" y="0"/>
+          <a:ext cx="0" cy="0"/>
+          <a:chOff x="0" y="0"/>
+          <a:chExt cx="0" cy="0"/>
+        </a:xfrm>
+      </p:grpSpPr>
+      <p:sp>
+        <p:nvSpPr>
+          <p:cNvPr id="2" name="Title 1"/>
+          <p:cNvSpPr>
+            <a:spLocks noGrp="1"/>
+          </p:cNvSpPr>
+          <p:nvPr>
+            <p:ph type="title"/>
+          </p:nvPr>
+        </p:nvSpPr>
+        <p:spPr/>
+        <p:txBody>
+          <a:bodyPr/>
+          <a:lstStyle/>
+          <a:p>
+            <a:r>
+              <a:rPr lang="en-US" dirty="0" smtClean="0"/>
+              <a:t>Arrays Cont.</a:t>
+            </a:r>
+            <a:endParaRPr lang="en-US" dirty="0"/>
+          </a:p>
+        </p:txBody>
+      </p:sp>
+      <p:sp>
+        <p:nvSpPr>
+          <p:cNvPr id="3" name="Content Placeholder 2"/>
+          <p:cNvSpPr>
+            <a:spLocks noGrp="1"/>
+          </p:cNvSpPr>
+          <p:nvPr>
+            <p:ph idx="1"/>
+          </p:nvPr>
+        </p:nvSpPr>
+        <p:spPr/>
+        <p:txBody>
+          <a:bodyPr>
+            <a:normAutofit lnSpcReduction="10000"/>
+          </a:bodyPr>
+          <a:lstStyle/>
+          <a:p>
+            <a:r>
+              <a:rPr lang="en-US" dirty="0" smtClean="0"/>
+              <a:t>An array is literally a collection of variables</a:t>
+            </a:r>
+          </a:p>
+          <a:p>
+            <a:r>
+              <a:rPr lang="en-US" dirty="0" smtClean="0"/>
+              <a:t>They are linearly ordered in memory</a:t>
+            </a:r>
+          </a:p>
+          <a:p>
+            <a:r>
+              <a:rPr lang="en-US" dirty="0" smtClean="0"/>
+              <a:t>Think of a row of boxes tightly fitted next to each other. The dimensions of the box are determined by the data type it needs to hold.</a:t>
+            </a:r>
+          </a:p>
+          <a:p>
+            <a:r>
+              <a:rPr lang="en-US" dirty="0" smtClean="0"/>
+              <a:t>Now take that row of boxes and put them in that massive finite 3D-space called memory.</a:t>
+            </a:r>
+          </a:p>
+          <a:p>
+            <a:r>
+              <a:rPr lang="en-US" dirty="0" smtClean="0"/>
+              <a:t>Great! Now we have an array of variables</a:t>
+            </a:r>
+          </a:p>
+          <a:p>
+            <a:endParaRPr lang="en-US" dirty="0" smtClean="0"/>
+          </a:p>
+        </p:txBody>
+      </p:sp>
+    </p:spTree>
+    <p:extLst>
+      <p:ext uri="{BB962C8B-B14F-4D97-AF65-F5344CB8AC3E}">
+        <p14:creationId xmlns:p14="http://schemas.microsoft.com/office/powerpoint/2010/main" val="3298709549"/>
+      </p:ext>
+    </p:extLst>
+  </p:cSld>
+  <p:clrMapOvr>
+    <a:masterClrMapping/>
+  </p:clrMapOvr>
+  <p:timing>
+    <p:tnLst>
+      <p:par>
+        <p:cTn xmlns:p14="http://schemas.microsoft.com/office/powerpoint/2010/main" id="1" dur="indefinite" restart="never" nodeType="tmRoot"/>
+      </p:par>
+    </p:tnLst>
+  </p:timing>
+</p:sld>
+</file>
+
+<file path=ppt/slides/slide15.xml><?xml version="1.0" encoding="utf-8"?>
+<p:sld xmlns:a="http://schemas.openxmlformats.org/drawingml/2006/main" xmlns:r="http://schemas.openxmlformats.org/officeDocument/2006/relationships" xmlns:p="http://schemas.openxmlformats.org/presentationml/2006/main">
+  <p:cSld>
+    <p:spTree>
+      <p:nvGrpSpPr>
+        <p:cNvPr id="1" name=""/>
+        <p:cNvGrpSpPr/>
+        <p:nvPr/>
+      </p:nvGrpSpPr>
+      <p:grpSpPr>
+        <a:xfrm>
+          <a:off x="0" y="0"/>
+          <a:ext cx="0" cy="0"/>
+          <a:chOff x="0" y="0"/>
+          <a:chExt cx="0" cy="0"/>
+        </a:xfrm>
+      </p:grpSpPr>
+      <p:sp>
+        <p:nvSpPr>
+          <p:cNvPr id="2" name="Title 1"/>
+          <p:cNvSpPr>
+            <a:spLocks noGrp="1"/>
+          </p:cNvSpPr>
+          <p:nvPr>
+            <p:ph type="title"/>
+          </p:nvPr>
+        </p:nvSpPr>
+        <p:spPr/>
+        <p:txBody>
+          <a:bodyPr/>
+          <a:lstStyle/>
+          <a:p>
+            <a:r>
+              <a:rPr lang="en-US" dirty="0" smtClean="0"/>
+              <a:t>Arrays Cont.</a:t>
+            </a:r>
+            <a:endParaRPr lang="en-US" dirty="0"/>
+          </a:p>
+        </p:txBody>
+      </p:sp>
+      <p:sp>
+        <p:nvSpPr>
+          <p:cNvPr id="3" name="Content Placeholder 2"/>
+          <p:cNvSpPr>
+            <a:spLocks noGrp="1"/>
+          </p:cNvSpPr>
+          <p:nvPr>
+            <p:ph idx="1"/>
+          </p:nvPr>
+        </p:nvSpPr>
+        <p:spPr/>
+        <p:txBody>
+          <a:bodyPr/>
+          <a:lstStyle/>
+          <a:p>
+            <a:r>
+              <a:rPr lang="en-US" dirty="0" smtClean="0"/>
+              <a:t>How to use an array:</a:t>
+            </a:r>
+          </a:p>
+          <a:p>
+            <a:pPr lvl="1"/>
+            <a:r>
+              <a:rPr lang="en-US" dirty="0" smtClean="0"/>
+              <a:t>Example : See </a:t>
+            </a:r>
+            <a:r>
+              <a:rPr lang="en-US" dirty="0" err="1" smtClean="0">
+                <a:latin typeface="Apple Chancery"/>
+                <a:cs typeface="Apple Chancery"/>
+              </a:rPr>
+              <a:t>A.cpp</a:t>
+            </a:r>
+            <a:endParaRPr lang="en-US" dirty="0" smtClean="0">
+              <a:latin typeface="Apple Chancery"/>
+              <a:cs typeface="Apple Chancery"/>
+            </a:endParaRPr>
+          </a:p>
+          <a:p>
+            <a:r>
+              <a:rPr lang="en-US" dirty="0" smtClean="0">
+                <a:cs typeface="Apple Chancery"/>
+              </a:rPr>
+              <a:t>Access an element in an array </a:t>
+            </a:r>
+            <a:r>
+              <a:rPr lang="en-US" dirty="0" smtClean="0">
+                <a:solidFill>
+                  <a:srgbClr val="C61B1B"/>
+                </a:solidFill>
+                <a:cs typeface="Apple Chancery"/>
+              </a:rPr>
+              <a:t>[ ]</a:t>
+            </a:r>
+            <a:endParaRPr lang="en-US" dirty="0" smtClean="0">
+              <a:solidFill>
+                <a:srgbClr val="C61B1B"/>
+              </a:solidFill>
+            </a:endParaRPr>
+          </a:p>
+          <a:p>
+            <a:r>
+              <a:rPr lang="en-US" dirty="0" smtClean="0"/>
+              <a:t>Define an an array as:  </a:t>
+            </a:r>
+          </a:p>
+          <a:p>
+            <a:pPr marL="0" indent="0">
+              <a:buNone/>
+            </a:pPr>
+            <a:r>
+              <a:rPr lang="en-US" dirty="0" smtClean="0"/>
+              <a:t>		  </a:t>
+            </a:r>
+            <a:r>
+              <a:rPr lang="en-US" dirty="0" err="1" smtClean="0">
+                <a:solidFill>
+                  <a:srgbClr val="C61B1B"/>
+                </a:solidFill>
+              </a:rPr>
+              <a:t>dataType</a:t>
+            </a:r>
+            <a:r>
+              <a:rPr lang="en-US" dirty="0" smtClean="0">
+                <a:solidFill>
+                  <a:srgbClr val="C61B1B"/>
+                </a:solidFill>
+              </a:rPr>
+              <a:t> </a:t>
+            </a:r>
+            <a:r>
+              <a:rPr lang="en-US" dirty="0" err="1" smtClean="0">
+                <a:solidFill>
+                  <a:srgbClr val="C61B1B"/>
+                </a:solidFill>
+              </a:rPr>
+              <a:t>variableName</a:t>
+            </a:r>
+            <a:r>
+              <a:rPr lang="en-US" dirty="0" smtClean="0">
+                <a:solidFill>
+                  <a:srgbClr val="C61B1B"/>
+                </a:solidFill>
+              </a:rPr>
+              <a:t>[size];</a:t>
+            </a:r>
+          </a:p>
+          <a:p>
+            <a:pPr marL="0" indent="0">
+              <a:buNone/>
+            </a:pPr>
+            <a:r>
+              <a:rPr lang="en-US" dirty="0" smtClean="0">
+                <a:solidFill>
+                  <a:srgbClr val="FFFFFF"/>
+                </a:solidFill>
+              </a:rPr>
+              <a:t>What happens when you use the array name without </a:t>
+            </a:r>
+            <a:r>
+              <a:rPr lang="en-US" dirty="0" smtClean="0">
+                <a:solidFill>
+                  <a:schemeClr val="accent4"/>
+                </a:solidFill>
+              </a:rPr>
+              <a:t>[ ]</a:t>
+            </a:r>
+            <a:r>
+              <a:rPr lang="en-US" dirty="0" smtClean="0">
+                <a:solidFill>
+                  <a:srgbClr val="FFFFFF"/>
+                </a:solidFill>
+              </a:rPr>
+              <a:t>?</a:t>
+            </a:r>
+          </a:p>
+        </p:txBody>
+      </p:sp>
+    </p:spTree>
+    <p:extLst>
+      <p:ext uri="{BB962C8B-B14F-4D97-AF65-F5344CB8AC3E}">
+        <p14:creationId xmlns:p14="http://schemas.microsoft.com/office/powerpoint/2010/main" val="1493731158"/>
+      </p:ext>
+    </p:extLst>
+  </p:cSld>
+  <p:clrMapOvr>
+    <a:masterClrMapping/>
+  </p:clrMapOvr>
+  <p:timing>
+    <p:tnLst>
+      <p:par>
+        <p:cTn xmlns:p14="http://schemas.microsoft.com/office/powerpoint/2010/main" id="1" dur="indefinite" restart="never" nodeType="tmRoot"/>
+      </p:par>
+    </p:tnLst>
+  </p:timing>
+</p:sld>
+</file>
+
+<file path=ppt/slides/slide16.xml><?xml version="1.0" encoding="utf-8"?>
+<p:sld xmlns:a="http://schemas.openxmlformats.org/drawingml/2006/main" xmlns:r="http://schemas.openxmlformats.org/officeDocument/2006/relationships" xmlns:p="http://schemas.openxmlformats.org/presentationml/2006/main">
+  <p:cSld>
+    <p:spTree>
+      <p:nvGrpSpPr>
+        <p:cNvPr id="1" name=""/>
+        <p:cNvGrpSpPr/>
+        <p:nvPr/>
+      </p:nvGrpSpPr>
+      <p:grpSpPr>
+        <a:xfrm>
+          <a:off x="0" y="0"/>
+          <a:ext cx="0" cy="0"/>
+          <a:chOff x="0" y="0"/>
+          <a:chExt cx="0" cy="0"/>
+        </a:xfrm>
+      </p:grpSpPr>
+      <p:sp>
+        <p:nvSpPr>
+          <p:cNvPr id="2" name="Title 1"/>
+          <p:cNvSpPr>
+            <a:spLocks noGrp="1"/>
+          </p:cNvSpPr>
+          <p:nvPr>
+            <p:ph type="title"/>
+          </p:nvPr>
+        </p:nvSpPr>
+        <p:spPr/>
+        <p:txBody>
+          <a:bodyPr/>
+          <a:lstStyle/>
+          <a:p>
+            <a:r>
+              <a:rPr lang="en-US" dirty="0" smtClean="0"/>
+              <a:t>Arrays as Pointers</a:t>
+            </a:r>
+            <a:endParaRPr lang="en-US" dirty="0"/>
+          </a:p>
+        </p:txBody>
+      </p:sp>
+      <p:sp>
+        <p:nvSpPr>
+          <p:cNvPr id="3" name="Content Placeholder 2"/>
+          <p:cNvSpPr>
+            <a:spLocks noGrp="1"/>
+          </p:cNvSpPr>
+          <p:nvPr>
+            <p:ph idx="1"/>
+          </p:nvPr>
+        </p:nvSpPr>
+        <p:spPr/>
+        <p:txBody>
+          <a:bodyPr/>
+          <a:lstStyle/>
+          <a:p>
+            <a:r>
+              <a:rPr lang="en-US" dirty="0" smtClean="0"/>
+              <a:t>An array is a pointer! WHAAAAT!?</a:t>
+            </a:r>
+          </a:p>
+          <a:p>
+            <a:r>
+              <a:rPr lang="en-US" dirty="0" smtClean="0"/>
+              <a:t>An array is just a special kind of pointer. </a:t>
+            </a:r>
+          </a:p>
+          <a:p>
+            <a:r>
+              <a:rPr lang="en-US" dirty="0" smtClean="0"/>
+              <a:t>Just declare it as follows and use it in the same way as normal arrays:</a:t>
+            </a:r>
+          </a:p>
+          <a:p>
+            <a:pPr lvl="2"/>
+            <a:r>
+              <a:rPr lang="en-US" dirty="0" err="1" smtClean="0">
+                <a:solidFill>
+                  <a:srgbClr val="C61B1B"/>
+                </a:solidFill>
+              </a:rPr>
+              <a:t>dataType</a:t>
+            </a:r>
+            <a:r>
+              <a:rPr lang="en-US" dirty="0" smtClean="0">
+                <a:solidFill>
+                  <a:srgbClr val="C61B1B"/>
+                </a:solidFill>
+              </a:rPr>
+              <a:t>* </a:t>
+            </a:r>
+            <a:r>
+              <a:rPr lang="en-US" dirty="0" err="1" smtClean="0">
+                <a:solidFill>
+                  <a:srgbClr val="C61B1B"/>
+                </a:solidFill>
+              </a:rPr>
+              <a:t>variableName</a:t>
+            </a:r>
+            <a:r>
+              <a:rPr lang="en-US" dirty="0" smtClean="0">
+                <a:solidFill>
+                  <a:srgbClr val="C61B1B"/>
+                </a:solidFill>
+              </a:rPr>
+              <a:t> = new </a:t>
+            </a:r>
+            <a:r>
+              <a:rPr lang="en-US" dirty="0" err="1" smtClean="0">
+                <a:solidFill>
+                  <a:srgbClr val="C61B1B"/>
+                </a:solidFill>
+              </a:rPr>
+              <a:t>dataType</a:t>
+            </a:r>
+            <a:r>
+              <a:rPr lang="en-US" dirty="0" smtClean="0">
+                <a:solidFill>
+                  <a:srgbClr val="C61B1B"/>
+                </a:solidFill>
+              </a:rPr>
+              <a:t>[10]</a:t>
+            </a:r>
+          </a:p>
+          <a:p>
+            <a:pPr lvl="2"/>
+            <a:r>
+              <a:rPr lang="en-US" dirty="0" smtClean="0">
+                <a:solidFill>
+                  <a:srgbClr val="FFFFFF"/>
+                </a:solidFill>
+              </a:rPr>
+              <a:t>Remember not to put * again on the second </a:t>
+            </a:r>
+            <a:r>
+              <a:rPr lang="en-US" dirty="0" err="1" smtClean="0">
+                <a:solidFill>
+                  <a:srgbClr val="FFFFFF"/>
+                </a:solidFill>
+              </a:rPr>
+              <a:t>dataType</a:t>
+            </a:r>
+            <a:endParaRPr lang="en-US" dirty="0" smtClean="0">
+              <a:solidFill>
+                <a:srgbClr val="FFFFFF"/>
+              </a:solidFill>
+            </a:endParaRPr>
+          </a:p>
+          <a:p>
+            <a:pPr lvl="2"/>
+            <a:r>
+              <a:rPr lang="en-US" dirty="0" smtClean="0">
+                <a:solidFill>
+                  <a:srgbClr val="FFFFFF"/>
+                </a:solidFill>
+              </a:rPr>
+              <a:t>Why? Look in </a:t>
+            </a:r>
+            <a:r>
+              <a:rPr lang="en-US" dirty="0" err="1" smtClean="0">
+                <a:solidFill>
+                  <a:srgbClr val="FFFFFF"/>
+                </a:solidFill>
+                <a:latin typeface="Apple Chancery"/>
+                <a:cs typeface="Apple Chancery"/>
+              </a:rPr>
+              <a:t>PA.cpp</a:t>
+            </a:r>
+            <a:endParaRPr lang="en-US" dirty="0" smtClean="0">
+              <a:solidFill>
+                <a:srgbClr val="FFFFFF"/>
+              </a:solidFill>
+            </a:endParaRPr>
+          </a:p>
+        </p:txBody>
+      </p:sp>
+    </p:spTree>
+    <p:extLst>
+      <p:ext uri="{BB962C8B-B14F-4D97-AF65-F5344CB8AC3E}">
+        <p14:creationId xmlns:p14="http://schemas.microsoft.com/office/powerpoint/2010/main" val="4081184300"/>
+      </p:ext>
+    </p:extLst>
+  </p:cSld>
+  <p:clrMapOvr>
+    <a:masterClrMapping/>
+  </p:clrMapOvr>
+  <p:timing>
+    <p:tnLst>
+      <p:par>
+        <p:cTn xmlns:p14="http://schemas.microsoft.com/office/powerpoint/2010/main" id="1" dur="indefinite" restart="never" nodeType="tmRoot"/>
+      </p:par>
+    </p:tnLst>
+  </p:timing>
+</p:sld>
+</file>
+
+<file path=ppt/slides/slide17.xml><?xml version="1.0" encoding="utf-8"?>
+<p:sld xmlns:a="http://schemas.openxmlformats.org/drawingml/2006/main" xmlns:r="http://schemas.openxmlformats.org/officeDocument/2006/relationships" xmlns:p="http://schemas.openxmlformats.org/presentationml/2006/main">
+  <p:cSld>
+    <p:spTree>
+      <p:nvGrpSpPr>
+        <p:cNvPr id="1" name=""/>
+        <p:cNvGrpSpPr/>
+        <p:nvPr/>
+      </p:nvGrpSpPr>
+      <p:grpSpPr>
+        <a:xfrm>
+          <a:off x="0" y="0"/>
+          <a:ext cx="0" cy="0"/>
+          <a:chOff x="0" y="0"/>
+          <a:chExt cx="0" cy="0"/>
+        </a:xfrm>
+      </p:grpSpPr>
+      <p:sp>
+        <p:nvSpPr>
+          <p:cNvPr id="2" name="Title 1"/>
+          <p:cNvSpPr>
+            <a:spLocks noGrp="1"/>
+          </p:cNvSpPr>
+          <p:nvPr>
+            <p:ph type="title"/>
+          </p:nvPr>
+        </p:nvSpPr>
+        <p:spPr/>
+        <p:txBody>
+          <a:bodyPr/>
+          <a:lstStyle/>
+          <a:p>
+            <a:r>
+              <a:rPr lang="en-US" dirty="0" smtClean="0"/>
+              <a:t>Let’s take a breather…</a:t>
+            </a:r>
+            <a:endParaRPr lang="en-US" dirty="0"/>
+          </a:p>
+        </p:txBody>
+      </p:sp>
+      <p:sp>
+        <p:nvSpPr>
+          <p:cNvPr id="3" name="Content Placeholder 2"/>
+          <p:cNvSpPr>
+            <a:spLocks noGrp="1"/>
+          </p:cNvSpPr>
+          <p:nvPr>
+            <p:ph idx="1"/>
+          </p:nvPr>
+        </p:nvSpPr>
+        <p:spPr/>
+        <p:txBody>
+          <a:bodyPr/>
+          <a:lstStyle/>
+          <a:p>
+            <a:r>
+              <a:rPr lang="en-US" dirty="0" smtClean="0"/>
+              <a:t>Ok, so  by now we have covered:</a:t>
+            </a:r>
+          </a:p>
+          <a:p>
+            <a:pPr lvl="1"/>
+            <a:r>
+              <a:rPr lang="en-US" dirty="0" smtClean="0"/>
+              <a:t>Data Types,</a:t>
+            </a:r>
+          </a:p>
+          <a:p>
+            <a:pPr lvl="1"/>
+            <a:r>
+              <a:rPr lang="en-US" dirty="0" smtClean="0"/>
+              <a:t>Pointers,</a:t>
+            </a:r>
+          </a:p>
+          <a:p>
+            <a:pPr lvl="1"/>
+            <a:r>
+              <a:rPr lang="en-US" dirty="0" smtClean="0"/>
+              <a:t>Arrays,</a:t>
+            </a:r>
+          </a:p>
+          <a:p>
+            <a:pPr lvl="1"/>
+            <a:r>
+              <a:rPr lang="en-US" dirty="0" smtClean="0"/>
+              <a:t>Arrays as Pointers</a:t>
+            </a:r>
+          </a:p>
+          <a:p>
+            <a:r>
+              <a:rPr lang="en-US" dirty="0" smtClean="0"/>
+              <a:t>Any questions?</a:t>
+            </a:r>
+          </a:p>
+          <a:p>
+            <a:r>
+              <a:rPr lang="en-US" dirty="0" smtClean="0"/>
+              <a:t>Now let’s have a look at functions and the layout of a program</a:t>
+            </a:r>
+          </a:p>
+        </p:txBody>
+      </p:sp>
+    </p:spTree>
+    <p:extLst>
+      <p:ext uri="{BB962C8B-B14F-4D97-AF65-F5344CB8AC3E}">
+        <p14:creationId xmlns:p14="http://schemas.microsoft.com/office/powerpoint/2010/main" val="801767754"/>
+      </p:ext>
+    </p:extLst>
+  </p:cSld>
+  <p:clrMapOvr>
+    <a:masterClrMapping/>
+  </p:clrMapOvr>
+  <p:timing>
+    <p:tnLst>
+      <p:par>
+        <p:cTn xmlns:p14="http://schemas.microsoft.com/office/powerpoint/2010/main" id="1" dur="indefinite" restart="never" nodeType="tmRoot"/>
+      </p:par>
+    </p:tnLst>
+  </p:timing>
+</p:sld>
+</file>
+
+<file path=ppt/slides/slide18.xml><?xml version="1.0" encoding="utf-8"?>
+<p:sld xmlns:a="http://schemas.openxmlformats.org/drawingml/2006/main" xmlns:r="http://schemas.openxmlformats.org/officeDocument/2006/relationships" xmlns:p="http://schemas.openxmlformats.org/presentationml/2006/main">
+  <p:cSld>
+    <p:spTree>
+      <p:nvGrpSpPr>
+        <p:cNvPr id="1" name=""/>
+        <p:cNvGrpSpPr/>
+        <p:nvPr/>
+      </p:nvGrpSpPr>
+      <p:grpSpPr>
+        <a:xfrm>
+          <a:off x="0" y="0"/>
+          <a:ext cx="0" cy="0"/>
+          <a:chOff x="0" y="0"/>
+          <a:chExt cx="0" cy="0"/>
+        </a:xfrm>
+      </p:grpSpPr>
+      <p:sp>
+        <p:nvSpPr>
+          <p:cNvPr id="2" name="Title 1"/>
+          <p:cNvSpPr>
+            <a:spLocks noGrp="1"/>
+          </p:cNvSpPr>
+          <p:nvPr>
+            <p:ph type="title"/>
+          </p:nvPr>
+        </p:nvSpPr>
+        <p:spPr/>
+        <p:txBody>
+          <a:bodyPr/>
+          <a:lstStyle/>
+          <a:p>
+            <a:r>
+              <a:rPr lang="en-US" dirty="0" smtClean="0"/>
+              <a:t>Functions</a:t>
+            </a:r>
+            <a:endParaRPr lang="en-US" dirty="0"/>
+          </a:p>
+        </p:txBody>
+      </p:sp>
+      <p:sp>
+        <p:nvSpPr>
+          <p:cNvPr id="3" name="Content Placeholder 2"/>
+          <p:cNvSpPr>
+            <a:spLocks noGrp="1"/>
+          </p:cNvSpPr>
+          <p:nvPr>
+            <p:ph idx="1"/>
+          </p:nvPr>
+        </p:nvSpPr>
+        <p:spPr/>
+        <p:txBody>
+          <a:bodyPr/>
+          <a:lstStyle/>
+          <a:p>
+            <a:r>
+              <a:rPr lang="en-US" dirty="0" smtClean="0"/>
+              <a:t>What is a function?</a:t>
+            </a:r>
+          </a:p>
+          <a:p>
+            <a:r>
+              <a:rPr lang="en-US" dirty="0" smtClean="0"/>
+              <a:t>Similarity with mathematical functions</a:t>
+            </a:r>
+          </a:p>
+          <a:p>
+            <a:r>
+              <a:rPr lang="en-US" dirty="0" smtClean="0"/>
+              <a:t>Why do we use functions?</a:t>
+            </a:r>
+          </a:p>
+          <a:p>
+            <a:r>
+              <a:rPr lang="en-US" dirty="0" smtClean="0"/>
+              <a:t>How to implement a function</a:t>
+            </a:r>
+          </a:p>
+          <a:p>
+            <a:r>
+              <a:rPr lang="en-US" dirty="0" smtClean="0"/>
+              <a:t>How to call a function</a:t>
+            </a:r>
+          </a:p>
+        </p:txBody>
+      </p:sp>
+    </p:spTree>
+    <p:extLst>
+      <p:ext uri="{BB962C8B-B14F-4D97-AF65-F5344CB8AC3E}">
+        <p14:creationId xmlns:p14="http://schemas.microsoft.com/office/powerpoint/2010/main" val="1549807554"/>
+      </p:ext>
+    </p:extLst>
+  </p:cSld>
+  <p:clrMapOvr>
+    <a:masterClrMapping/>
+  </p:clrMapOvr>
+  <p:timing>
+    <p:tnLst>
+      <p:par>
+        <p:cTn xmlns:p14="http://schemas.microsoft.com/office/powerpoint/2010/main" id="1" dur="indefinite" restart="never" nodeType="tmRoot"/>
+      </p:par>
+    </p:tnLst>
+  </p:timing>
+</p:sld>
+</file>
+
+<file path=ppt/slides/slide19.xml><?xml version="1.0" encoding="utf-8"?>
+<p:sld xmlns:a="http://schemas.openxmlformats.org/drawingml/2006/main" xmlns:r="http://schemas.openxmlformats.org/officeDocument/2006/relationships" xmlns:p="http://schemas.openxmlformats.org/presentationml/2006/main">
+  <p:cSld>
+    <p:spTree>
+      <p:nvGrpSpPr>
+        <p:cNvPr id="1" name=""/>
+        <p:cNvGrpSpPr/>
+        <p:nvPr/>
+      </p:nvGrpSpPr>
+      <p:grpSpPr>
+        <a:xfrm>
+          <a:off x="0" y="0"/>
+          <a:ext cx="0" cy="0"/>
+          <a:chOff x="0" y="0"/>
+          <a:chExt cx="0" cy="0"/>
+        </a:xfrm>
+      </p:grpSpPr>
+      <p:sp>
+        <p:nvSpPr>
+          <p:cNvPr id="2" name="Title 1"/>
+          <p:cNvSpPr>
+            <a:spLocks noGrp="1"/>
+          </p:cNvSpPr>
+          <p:nvPr>
+            <p:ph type="title"/>
+          </p:nvPr>
+        </p:nvSpPr>
+        <p:spPr/>
+        <p:txBody>
+          <a:bodyPr/>
+          <a:lstStyle/>
+          <a:p>
+            <a:r>
+              <a:rPr lang="en-US" dirty="0" smtClean="0"/>
+              <a:t>Functions Cont.</a:t>
+            </a:r>
+            <a:endParaRPr lang="en-US" dirty="0"/>
+          </a:p>
+        </p:txBody>
+      </p:sp>
+      <p:sp>
+        <p:nvSpPr>
+          <p:cNvPr id="3" name="Content Placeholder 2"/>
+          <p:cNvSpPr>
+            <a:spLocks noGrp="1"/>
+          </p:cNvSpPr>
+          <p:nvPr>
+            <p:ph idx="1"/>
+          </p:nvPr>
+        </p:nvSpPr>
+        <p:spPr/>
+        <p:txBody>
+          <a:bodyPr/>
+          <a:lstStyle/>
+          <a:p>
+            <a:r>
+              <a:rPr lang="en-US" dirty="0" smtClean="0"/>
+              <a:t>What is a function?</a:t>
+            </a:r>
+          </a:p>
+          <a:p>
+            <a:pPr lvl="1"/>
+            <a:r>
+              <a:rPr lang="en-US" dirty="0" smtClean="0"/>
+              <a:t>Functions have a lot of different names, amongst others:</a:t>
+            </a:r>
+          </a:p>
+          <a:p>
+            <a:pPr lvl="3"/>
+            <a:r>
+              <a:rPr lang="en-US" dirty="0" smtClean="0"/>
+              <a:t>Procedure</a:t>
+            </a:r>
+          </a:p>
+          <a:p>
+            <a:pPr lvl="3"/>
+            <a:r>
+              <a:rPr lang="en-US" dirty="0" smtClean="0"/>
+              <a:t>Sub Procedure</a:t>
+            </a:r>
+          </a:p>
+          <a:p>
+            <a:pPr lvl="3"/>
+            <a:r>
+              <a:rPr lang="en-US" dirty="0" smtClean="0"/>
+              <a:t>Sub Function</a:t>
+            </a:r>
+          </a:p>
+          <a:p>
+            <a:pPr lvl="3"/>
+            <a:r>
+              <a:rPr lang="en-US" dirty="0" smtClean="0"/>
+              <a:t>Sub</a:t>
+            </a:r>
+          </a:p>
+          <a:p>
+            <a:pPr lvl="3"/>
+            <a:r>
+              <a:rPr lang="en-US" dirty="0" smtClean="0"/>
+              <a:t>Method</a:t>
+            </a:r>
+          </a:p>
+          <a:p>
+            <a:pPr lvl="3"/>
+            <a:r>
+              <a:rPr lang="en-US" dirty="0" smtClean="0"/>
+              <a:t>Sub Routine</a:t>
+            </a:r>
+          </a:p>
+          <a:p>
+            <a:pPr lvl="3"/>
+            <a:r>
+              <a:rPr lang="en-US" dirty="0" smtClean="0"/>
+              <a:t>Etc…</a:t>
+            </a:r>
+            <a:endParaRPr lang="en-US" dirty="0"/>
+          </a:p>
+        </p:txBody>
+      </p:sp>
+    </p:spTree>
+    <p:extLst>
+      <p:ext uri="{BB962C8B-B14F-4D97-AF65-F5344CB8AC3E}">
+        <p14:creationId xmlns:p14="http://schemas.microsoft.com/office/powerpoint/2010/main" val="1900869117"/>
+      </p:ext>
+    </p:extLst>
+  </p:cSld>
+  <p:clrMapOvr>
+    <a:masterClrMapping/>
+  </p:clrMapOvr>
+  <p:timing>
+    <p:tnLst>
+      <p:par>
+        <p:cTn xmlns:p14="http://schemas.microsoft.com/office/powerpoint/2010/main" id="1" dur="indefinite" restart="never" nodeType="tmRoot"/>
+      </p:par>
+    </p:tnLst>
+  </p:timing>
 </p:sld>
 </file>
 
@@ -3863,21 +5230,65 @@
         </p:nvSpPr>
         <p:spPr/>
         <p:txBody>
-          <a:bodyPr/>
-          <a:lstStyle/>
-          <a:p>
-            <a:r>
-              <a:rPr lang="en-US" dirty="0" smtClean="0"/>
-              <a:t>All the examples that will be </a:t>
-            </a:r>
-            <a:r>
-              <a:rPr lang="en-US" smtClean="0"/>
-              <a:t>discussed available here:</a:t>
+          <a:bodyPr>
+            <a:normAutofit lnSpcReduction="10000"/>
+          </a:bodyPr>
+          <a:lstStyle/>
+          <a:p>
+            <a:r>
+              <a:rPr lang="en-US" dirty="0" smtClean="0"/>
+              <a:t>All the examples that will be discussed, available here:</a:t>
             </a:r>
           </a:p>
           <a:p>
             <a:pPr lvl="1"/>
+            <a:r>
+              <a:rPr lang="en-US" dirty="0">
+                <a:hlinkClick r:id="rId2"/>
+              </a:rPr>
+              <a:t>https://github.com/WMostert1/COS132-Crash-</a:t>
+            </a:r>
+            <a:r>
+              <a:rPr lang="en-US" dirty="0" smtClean="0">
+                <a:hlinkClick r:id="rId2"/>
+              </a:rPr>
+              <a:t>Course</a:t>
+            </a:r>
             <a:endParaRPr lang="en-US" dirty="0"/>
+          </a:p>
+          <a:p>
+            <a:r>
+              <a:rPr lang="en-US" dirty="0" smtClean="0"/>
+              <a:t>How do I get the code?</a:t>
+            </a:r>
+          </a:p>
+          <a:p>
+            <a:pPr lvl="1"/>
+            <a:r>
+              <a:rPr lang="en-US" dirty="0" smtClean="0"/>
+              <a:t>It’s easy! Go the link above, click on “Clone in Desktop” to clone the repository. Just sync to get new code.</a:t>
+            </a:r>
+          </a:p>
+          <a:p>
+            <a:pPr lvl="1"/>
+            <a:r>
+              <a:rPr lang="en-US" dirty="0" smtClean="0"/>
+              <a:t>Other option, click on “Download ZIP” to download the archive</a:t>
+            </a:r>
+          </a:p>
+          <a:p>
+            <a:r>
+              <a:rPr lang="en-US" dirty="0" smtClean="0"/>
+              <a:t>Let</a:t>
+            </a:r>
+            <a:r>
+              <a:rPr lang="fr-FR" dirty="0" smtClean="0"/>
+              <a:t>’</a:t>
+            </a:r>
+            <a:r>
+              <a:rPr lang="en-US" dirty="0" smtClean="0"/>
+              <a:t>s get started!</a:t>
+            </a:r>
           </a:p>
         </p:txBody>
       </p:sp>
@@ -3891,6 +5302,2890 @@
   <p:clrMapOvr>
     <a:masterClrMapping/>
   </p:clrMapOvr>
+  <p:timing>
+    <p:tnLst>
+      <p:par>
+        <p:cTn xmlns:p14="http://schemas.microsoft.com/office/powerpoint/2010/main" id="1" dur="indefinite" restart="never" nodeType="tmRoot"/>
+      </p:par>
+    </p:tnLst>
+  </p:timing>
+</p:sld>
+</file>
+
+<file path=ppt/slides/slide20.xml><?xml version="1.0" encoding="utf-8"?>
+<p:sld xmlns:a="http://schemas.openxmlformats.org/drawingml/2006/main" xmlns:r="http://schemas.openxmlformats.org/officeDocument/2006/relationships" xmlns:p="http://schemas.openxmlformats.org/presentationml/2006/main">
+  <p:cSld>
+    <p:spTree>
+      <p:nvGrpSpPr>
+        <p:cNvPr id="1" name=""/>
+        <p:cNvGrpSpPr/>
+        <p:nvPr/>
+      </p:nvGrpSpPr>
+      <p:grpSpPr>
+        <a:xfrm>
+          <a:off x="0" y="0"/>
+          <a:ext cx="0" cy="0"/>
+          <a:chOff x="0" y="0"/>
+          <a:chExt cx="0" cy="0"/>
+        </a:xfrm>
+      </p:grpSpPr>
+      <p:sp>
+        <p:nvSpPr>
+          <p:cNvPr id="2" name="Title 1"/>
+          <p:cNvSpPr>
+            <a:spLocks noGrp="1"/>
+          </p:cNvSpPr>
+          <p:nvPr>
+            <p:ph type="title"/>
+          </p:nvPr>
+        </p:nvSpPr>
+        <p:spPr/>
+        <p:txBody>
+          <a:bodyPr/>
+          <a:lstStyle/>
+          <a:p>
+            <a:r>
+              <a:rPr lang="en-US" dirty="0" smtClean="0"/>
+              <a:t>Functions Cont.</a:t>
+            </a:r>
+            <a:endParaRPr lang="en-US" dirty="0"/>
+          </a:p>
+        </p:txBody>
+      </p:sp>
+      <p:sp>
+        <p:nvSpPr>
+          <p:cNvPr id="3" name="Content Placeholder 2"/>
+          <p:cNvSpPr>
+            <a:spLocks noGrp="1"/>
+          </p:cNvSpPr>
+          <p:nvPr>
+            <p:ph idx="1"/>
+          </p:nvPr>
+        </p:nvSpPr>
+        <p:spPr/>
+        <p:txBody>
+          <a:bodyPr>
+            <a:normAutofit lnSpcReduction="10000"/>
+          </a:bodyPr>
+          <a:lstStyle/>
+          <a:p>
+            <a:r>
+              <a:rPr lang="en-US" dirty="0" smtClean="0"/>
+              <a:t>The goal of a function is to “do” something.</a:t>
+            </a:r>
+          </a:p>
+          <a:p>
+            <a:r>
+              <a:rPr lang="en-US" dirty="0" smtClean="0"/>
+              <a:t>If you think of any action. Any action could be a function, examples:</a:t>
+            </a:r>
+          </a:p>
+          <a:p>
+            <a:pPr lvl="1"/>
+            <a:r>
+              <a:rPr lang="en-US" dirty="0" smtClean="0"/>
+              <a:t>To kick a dog:</a:t>
+            </a:r>
+          </a:p>
+          <a:p>
+            <a:pPr lvl="2"/>
+            <a:r>
+              <a:rPr lang="en-US" dirty="0" smtClean="0"/>
+              <a:t>Void </a:t>
+            </a:r>
+            <a:r>
+              <a:rPr lang="en-US" dirty="0" err="1" smtClean="0"/>
+              <a:t>kickThatDog</a:t>
+            </a:r>
+            <a:r>
+              <a:rPr lang="en-US" dirty="0" smtClean="0"/>
+              <a:t>(){…you kick the dog…}</a:t>
+            </a:r>
+          </a:p>
+          <a:p>
+            <a:pPr lvl="1"/>
+            <a:r>
+              <a:rPr lang="en-US" dirty="0" smtClean="0"/>
+              <a:t>To feel horrible for kicking a dog:</a:t>
+            </a:r>
+          </a:p>
+          <a:p>
+            <a:pPr lvl="2"/>
+            <a:r>
+              <a:rPr lang="en-US" dirty="0" smtClean="0"/>
+              <a:t>Void </a:t>
+            </a:r>
+            <a:r>
+              <a:rPr lang="en-US" dirty="0" err="1" smtClean="0"/>
+              <a:t>feelHorrible</a:t>
+            </a:r>
+            <a:r>
+              <a:rPr lang="en-US" dirty="0" smtClean="0"/>
+              <a:t>(){…you cry…}</a:t>
+            </a:r>
+          </a:p>
+          <a:p>
+            <a:pPr lvl="1"/>
+            <a:r>
+              <a:rPr lang="en-US" dirty="0" smtClean="0"/>
+              <a:t>Pay the vet money to help the dog:</a:t>
+            </a:r>
+          </a:p>
+          <a:p>
+            <a:pPr lvl="2"/>
+            <a:r>
+              <a:rPr lang="en-US" dirty="0" smtClean="0"/>
+              <a:t>Double </a:t>
+            </a:r>
+            <a:r>
+              <a:rPr lang="en-US" dirty="0" err="1" smtClean="0"/>
+              <a:t>payMoneyToVet</a:t>
+            </a:r>
+            <a:r>
+              <a:rPr lang="en-US" dirty="0" smtClean="0"/>
+              <a:t>(double money){..hand over money… return change;}</a:t>
+            </a:r>
+          </a:p>
+        </p:txBody>
+      </p:sp>
+    </p:spTree>
+    <p:extLst>
+      <p:ext uri="{BB962C8B-B14F-4D97-AF65-F5344CB8AC3E}">
+        <p14:creationId xmlns:p14="http://schemas.microsoft.com/office/powerpoint/2010/main" val="1875142462"/>
+      </p:ext>
+    </p:extLst>
+  </p:cSld>
+  <p:clrMapOvr>
+    <a:masterClrMapping/>
+  </p:clrMapOvr>
+  <p:timing>
+    <p:tnLst>
+      <p:par>
+        <p:cTn xmlns:p14="http://schemas.microsoft.com/office/powerpoint/2010/main" id="1" dur="indefinite" restart="never" nodeType="tmRoot"/>
+      </p:par>
+    </p:tnLst>
+  </p:timing>
+</p:sld>
+</file>
+
+<file path=ppt/slides/slide21.xml><?xml version="1.0" encoding="utf-8"?>
+<p:sld xmlns:a="http://schemas.openxmlformats.org/drawingml/2006/main" xmlns:r="http://schemas.openxmlformats.org/officeDocument/2006/relationships" xmlns:p="http://schemas.openxmlformats.org/presentationml/2006/main">
+  <p:cSld>
+    <p:spTree>
+      <p:nvGrpSpPr>
+        <p:cNvPr id="1" name=""/>
+        <p:cNvGrpSpPr/>
+        <p:nvPr/>
+      </p:nvGrpSpPr>
+      <p:grpSpPr>
+        <a:xfrm>
+          <a:off x="0" y="0"/>
+          <a:ext cx="0" cy="0"/>
+          <a:chOff x="0" y="0"/>
+          <a:chExt cx="0" cy="0"/>
+        </a:xfrm>
+      </p:grpSpPr>
+      <p:sp>
+        <p:nvSpPr>
+          <p:cNvPr id="2" name="Title 1"/>
+          <p:cNvSpPr>
+            <a:spLocks noGrp="1"/>
+          </p:cNvSpPr>
+          <p:nvPr>
+            <p:ph type="title"/>
+          </p:nvPr>
+        </p:nvSpPr>
+        <p:spPr/>
+        <p:txBody>
+          <a:bodyPr/>
+          <a:lstStyle/>
+          <a:p>
+            <a:r>
+              <a:rPr lang="en-US" dirty="0" smtClean="0"/>
+              <a:t>Functions Cont.</a:t>
+            </a:r>
+            <a:endParaRPr lang="en-US" dirty="0"/>
+          </a:p>
+        </p:txBody>
+      </p:sp>
+      <p:sp>
+        <p:nvSpPr>
+          <p:cNvPr id="3" name="Content Placeholder 2"/>
+          <p:cNvSpPr>
+            <a:spLocks noGrp="1"/>
+          </p:cNvSpPr>
+          <p:nvPr>
+            <p:ph idx="1"/>
+          </p:nvPr>
+        </p:nvSpPr>
+        <p:spPr/>
+        <p:txBody>
+          <a:bodyPr/>
+          <a:lstStyle/>
+          <a:p>
+            <a:r>
+              <a:rPr lang="en-US" dirty="0" smtClean="0"/>
+              <a:t>In mathematics one also uses functions:</a:t>
+            </a:r>
+          </a:p>
+          <a:p>
+            <a:r>
+              <a:rPr lang="en-US" dirty="0" smtClean="0"/>
+              <a:t>In </a:t>
+            </a:r>
+            <a:r>
+              <a:rPr lang="en-US" dirty="0"/>
+              <a:t>C</a:t>
+            </a:r>
+            <a:r>
+              <a:rPr lang="en-US" dirty="0" smtClean="0"/>
+              <a:t>++: See </a:t>
+            </a:r>
+            <a:r>
+              <a:rPr lang="en-US" dirty="0" err="1" smtClean="0">
+                <a:latin typeface="Apple Chancery"/>
+                <a:cs typeface="Apple Chancery"/>
+              </a:rPr>
+              <a:t>sigmoid.cpp</a:t>
+            </a:r>
+            <a:endParaRPr lang="en-US" dirty="0">
+              <a:latin typeface="Apple Chancery"/>
+              <a:cs typeface="Apple Chancery"/>
+            </a:endParaRPr>
+          </a:p>
+        </p:txBody>
+      </p:sp>
+      <p:pic>
+        <p:nvPicPr>
+          <p:cNvPr id="4" name="Picture 3"/>
+          <p:cNvPicPr>
+            <a:picLocks noChangeAspect="1"/>
+          </p:cNvPicPr>
+          <p:nvPr/>
+        </p:nvPicPr>
+        <p:blipFill>
+          <a:blip r:embed="rId2"/>
+          <a:stretch>
+            <a:fillRect/>
+          </a:stretch>
+        </p:blipFill>
+        <p:spPr>
+          <a:xfrm>
+            <a:off x="1289384" y="3461084"/>
+            <a:ext cx="6324600" cy="2743200"/>
+          </a:xfrm>
+          <a:prstGeom prst="rect">
+            <a:avLst/>
+          </a:prstGeom>
+        </p:spPr>
+      </p:pic>
+    </p:spTree>
+    <p:extLst>
+      <p:ext uri="{BB962C8B-B14F-4D97-AF65-F5344CB8AC3E}">
+        <p14:creationId xmlns:p14="http://schemas.microsoft.com/office/powerpoint/2010/main" val="55219799"/>
+      </p:ext>
+    </p:extLst>
+  </p:cSld>
+  <p:clrMapOvr>
+    <a:masterClrMapping/>
+  </p:clrMapOvr>
+  <p:timing>
+    <p:tnLst>
+      <p:par>
+        <p:cTn xmlns:p14="http://schemas.microsoft.com/office/powerpoint/2010/main" id="1" dur="indefinite" restart="never" nodeType="tmRoot"/>
+      </p:par>
+    </p:tnLst>
+  </p:timing>
+</p:sld>
+</file>
+
+<file path=ppt/slides/slide22.xml><?xml version="1.0" encoding="utf-8"?>
+<p:sld xmlns:a="http://schemas.openxmlformats.org/drawingml/2006/main" xmlns:r="http://schemas.openxmlformats.org/officeDocument/2006/relationships" xmlns:p="http://schemas.openxmlformats.org/presentationml/2006/main">
+  <p:cSld>
+    <p:spTree>
+      <p:nvGrpSpPr>
+        <p:cNvPr id="1" name=""/>
+        <p:cNvGrpSpPr/>
+        <p:nvPr/>
+      </p:nvGrpSpPr>
+      <p:grpSpPr>
+        <a:xfrm>
+          <a:off x="0" y="0"/>
+          <a:ext cx="0" cy="0"/>
+          <a:chOff x="0" y="0"/>
+          <a:chExt cx="0" cy="0"/>
+        </a:xfrm>
+      </p:grpSpPr>
+      <p:sp>
+        <p:nvSpPr>
+          <p:cNvPr id="2" name="Title 1"/>
+          <p:cNvSpPr>
+            <a:spLocks noGrp="1"/>
+          </p:cNvSpPr>
+          <p:nvPr>
+            <p:ph type="title"/>
+          </p:nvPr>
+        </p:nvSpPr>
+        <p:spPr/>
+        <p:txBody>
+          <a:bodyPr/>
+          <a:lstStyle/>
+          <a:p>
+            <a:r>
+              <a:rPr lang="en-US" dirty="0" smtClean="0"/>
+              <a:t>Functions Cont.</a:t>
+            </a:r>
+            <a:endParaRPr lang="en-US" dirty="0"/>
+          </a:p>
+        </p:txBody>
+      </p:sp>
+      <p:sp>
+        <p:nvSpPr>
+          <p:cNvPr id="3" name="Content Placeholder 2"/>
+          <p:cNvSpPr>
+            <a:spLocks noGrp="1"/>
+          </p:cNvSpPr>
+          <p:nvPr>
+            <p:ph idx="1"/>
+          </p:nvPr>
+        </p:nvSpPr>
+        <p:spPr/>
+        <p:txBody>
+          <a:bodyPr/>
+          <a:lstStyle/>
+          <a:p>
+            <a:r>
+              <a:rPr lang="en-US" dirty="0" smtClean="0"/>
+              <a:t>For all the actuaries present, the usefulness of functions should now become rather apparent</a:t>
+            </a:r>
+          </a:p>
+          <a:p>
+            <a:r>
+              <a:rPr lang="en-US" dirty="0" smtClean="0"/>
+              <a:t>The only reason we use “functions” is for code re-use and modularity</a:t>
+            </a:r>
+          </a:p>
+          <a:p>
+            <a:r>
+              <a:rPr lang="en-US" dirty="0" smtClean="0"/>
+              <a:t>The sigmoid function is a rather simple example, it could however be strenuous to type it out every time you want to calculate the sigmoid value. To illustrate this point further :</a:t>
+            </a:r>
+          </a:p>
+        </p:txBody>
+      </p:sp>
+    </p:spTree>
+    <p:extLst>
+      <p:ext uri="{BB962C8B-B14F-4D97-AF65-F5344CB8AC3E}">
+        <p14:creationId xmlns:p14="http://schemas.microsoft.com/office/powerpoint/2010/main" val="3389155424"/>
+      </p:ext>
+    </p:extLst>
+  </p:cSld>
+  <p:clrMapOvr>
+    <a:masterClrMapping/>
+  </p:clrMapOvr>
+  <p:timing>
+    <p:tnLst>
+      <p:par>
+        <p:cTn xmlns:p14="http://schemas.microsoft.com/office/powerpoint/2010/main" id="1" dur="indefinite" restart="never" nodeType="tmRoot"/>
+      </p:par>
+    </p:tnLst>
+  </p:timing>
+</p:sld>
+</file>
+
+<file path=ppt/slides/slide23.xml><?xml version="1.0" encoding="utf-8"?>
+<p:sld xmlns:a="http://schemas.openxmlformats.org/drawingml/2006/main" xmlns:r="http://schemas.openxmlformats.org/officeDocument/2006/relationships" xmlns:p="http://schemas.openxmlformats.org/presentationml/2006/main">
+  <p:cSld>
+    <p:spTree>
+      <p:nvGrpSpPr>
+        <p:cNvPr id="1" name=""/>
+        <p:cNvGrpSpPr/>
+        <p:nvPr/>
+      </p:nvGrpSpPr>
+      <p:grpSpPr>
+        <a:xfrm>
+          <a:off x="0" y="0"/>
+          <a:ext cx="0" cy="0"/>
+          <a:chOff x="0" y="0"/>
+          <a:chExt cx="0" cy="0"/>
+        </a:xfrm>
+      </p:grpSpPr>
+      <p:pic>
+        <p:nvPicPr>
+          <p:cNvPr id="6" name="Picture 5" descr="Screen Shot 2015-05-27 at 6.03.55 PM.png"/>
+          <p:cNvPicPr>
+            <a:picLocks noChangeAspect="1"/>
+          </p:cNvPicPr>
+          <p:nvPr/>
+        </p:nvPicPr>
+        <p:blipFill>
+          <a:blip r:embed="rId2">
+            <a:extLst>
+              <a:ext uri="{28A0092B-C50C-407E-A947-70E740481C1C}">
+                <a14:useLocalDpi xmlns:a14="http://schemas.microsoft.com/office/drawing/2010/main" val="0"/>
+              </a:ext>
+            </a:extLst>
+          </a:blip>
+          <a:stretch>
+            <a:fillRect/>
+          </a:stretch>
+        </p:blipFill>
+        <p:spPr>
+          <a:xfrm>
+            <a:off x="0" y="152656"/>
+            <a:ext cx="9144000" cy="6512583"/>
+          </a:xfrm>
+          <a:prstGeom prst="rect">
+            <a:avLst/>
+          </a:prstGeom>
+        </p:spPr>
+      </p:pic>
+    </p:spTree>
+    <p:extLst>
+      <p:ext uri="{BB962C8B-B14F-4D97-AF65-F5344CB8AC3E}">
+        <p14:creationId xmlns:p14="http://schemas.microsoft.com/office/powerpoint/2010/main" val="735209119"/>
+      </p:ext>
+    </p:extLst>
+  </p:cSld>
+  <p:clrMapOvr>
+    <a:masterClrMapping/>
+  </p:clrMapOvr>
+  <p:timing>
+    <p:tnLst>
+      <p:par>
+        <p:cTn xmlns:p14="http://schemas.microsoft.com/office/powerpoint/2010/main" id="1" dur="indefinite" restart="never" nodeType="tmRoot"/>
+      </p:par>
+    </p:tnLst>
+  </p:timing>
+</p:sld>
+</file>
+
+<file path=ppt/slides/slide24.xml><?xml version="1.0" encoding="utf-8"?>
+<p:sld xmlns:a="http://schemas.openxmlformats.org/drawingml/2006/main" xmlns:r="http://schemas.openxmlformats.org/officeDocument/2006/relationships" xmlns:p="http://schemas.openxmlformats.org/presentationml/2006/main">
+  <p:cSld>
+    <p:spTree>
+      <p:nvGrpSpPr>
+        <p:cNvPr id="1" name=""/>
+        <p:cNvGrpSpPr/>
+        <p:nvPr/>
+      </p:nvGrpSpPr>
+      <p:grpSpPr>
+        <a:xfrm>
+          <a:off x="0" y="0"/>
+          <a:ext cx="0" cy="0"/>
+          <a:chOff x="0" y="0"/>
+          <a:chExt cx="0" cy="0"/>
+        </a:xfrm>
+      </p:grpSpPr>
+      <p:sp>
+        <p:nvSpPr>
+          <p:cNvPr id="2" name="Title 1"/>
+          <p:cNvSpPr>
+            <a:spLocks noGrp="1"/>
+          </p:cNvSpPr>
+          <p:nvPr>
+            <p:ph type="title"/>
+          </p:nvPr>
+        </p:nvSpPr>
+        <p:spPr/>
+        <p:txBody>
+          <a:bodyPr/>
+          <a:lstStyle/>
+          <a:p>
+            <a:r>
+              <a:rPr lang="en-US" dirty="0" smtClean="0"/>
+              <a:t>Functions Cont.</a:t>
+            </a:r>
+            <a:endParaRPr lang="en-US" dirty="0"/>
+          </a:p>
+        </p:txBody>
+      </p:sp>
+      <p:sp>
+        <p:nvSpPr>
+          <p:cNvPr id="3" name="Content Placeholder 2"/>
+          <p:cNvSpPr>
+            <a:spLocks noGrp="1"/>
+          </p:cNvSpPr>
+          <p:nvPr>
+            <p:ph idx="1"/>
+          </p:nvPr>
+        </p:nvSpPr>
+        <p:spPr/>
+        <p:txBody>
+          <a:bodyPr/>
+          <a:lstStyle/>
+          <a:p>
+            <a:r>
+              <a:rPr lang="en-US" dirty="0" smtClean="0"/>
+              <a:t>The screenshot on the previous slide shows a function to calculate the frequency of alphabet characters in a text file with thousands of words in it</a:t>
+            </a:r>
+          </a:p>
+          <a:p>
+            <a:r>
+              <a:rPr lang="en-US" dirty="0" smtClean="0"/>
+              <a:t>You definitely don’t want to re-write all that every time</a:t>
+            </a:r>
+          </a:p>
+        </p:txBody>
+      </p:sp>
+    </p:spTree>
+    <p:extLst>
+      <p:ext uri="{BB962C8B-B14F-4D97-AF65-F5344CB8AC3E}">
+        <p14:creationId xmlns:p14="http://schemas.microsoft.com/office/powerpoint/2010/main" val="2413299217"/>
+      </p:ext>
+    </p:extLst>
+  </p:cSld>
+  <p:clrMapOvr>
+    <a:masterClrMapping/>
+  </p:clrMapOvr>
+  <p:timing>
+    <p:tnLst>
+      <p:par>
+        <p:cTn xmlns:p14="http://schemas.microsoft.com/office/powerpoint/2010/main" id="1" dur="indefinite" restart="never" nodeType="tmRoot"/>
+      </p:par>
+    </p:tnLst>
+  </p:timing>
+</p:sld>
+</file>
+
+<file path=ppt/slides/slide25.xml><?xml version="1.0" encoding="utf-8"?>
+<p:sld xmlns:a="http://schemas.openxmlformats.org/drawingml/2006/main" xmlns:r="http://schemas.openxmlformats.org/officeDocument/2006/relationships" xmlns:p="http://schemas.openxmlformats.org/presentationml/2006/main">
+  <p:cSld>
+    <p:spTree>
+      <p:nvGrpSpPr>
+        <p:cNvPr id="1" name=""/>
+        <p:cNvGrpSpPr/>
+        <p:nvPr/>
+      </p:nvGrpSpPr>
+      <p:grpSpPr>
+        <a:xfrm>
+          <a:off x="0" y="0"/>
+          <a:ext cx="0" cy="0"/>
+          <a:chOff x="0" y="0"/>
+          <a:chExt cx="0" cy="0"/>
+        </a:xfrm>
+      </p:grpSpPr>
+      <p:sp>
+        <p:nvSpPr>
+          <p:cNvPr id="2" name="Title 1"/>
+          <p:cNvSpPr>
+            <a:spLocks noGrp="1"/>
+          </p:cNvSpPr>
+          <p:nvPr>
+            <p:ph type="title"/>
+          </p:nvPr>
+        </p:nvSpPr>
+        <p:spPr/>
+        <p:txBody>
+          <a:bodyPr/>
+          <a:lstStyle/>
+          <a:p>
+            <a:r>
+              <a:rPr lang="en-US" dirty="0" smtClean="0"/>
+              <a:t>Functions Cont.</a:t>
+            </a:r>
+            <a:endParaRPr lang="en-US" dirty="0"/>
+          </a:p>
+        </p:txBody>
+      </p:sp>
+      <p:sp>
+        <p:nvSpPr>
+          <p:cNvPr id="3" name="Content Placeholder 2"/>
+          <p:cNvSpPr>
+            <a:spLocks noGrp="1"/>
+          </p:cNvSpPr>
+          <p:nvPr>
+            <p:ph idx="1"/>
+          </p:nvPr>
+        </p:nvSpPr>
+        <p:spPr/>
+        <p:txBody>
+          <a:bodyPr/>
+          <a:lstStyle/>
+          <a:p>
+            <a:r>
+              <a:rPr lang="en-US" dirty="0" smtClean="0"/>
+              <a:t>How to implement a function?</a:t>
+            </a:r>
+          </a:p>
+          <a:p>
+            <a:r>
+              <a:rPr lang="en-US" dirty="0" smtClean="0"/>
+              <a:t>Start with the prototype</a:t>
+            </a:r>
+          </a:p>
+          <a:p>
+            <a:r>
+              <a:rPr lang="en-US" dirty="0" smtClean="0"/>
+              <a:t>General formula for a prototype:</a:t>
+            </a:r>
+          </a:p>
+          <a:p>
+            <a:pPr lvl="1"/>
+            <a:r>
+              <a:rPr lang="en-US" dirty="0" err="1" smtClean="0">
+                <a:solidFill>
+                  <a:schemeClr val="accent4"/>
+                </a:solidFill>
+              </a:rPr>
+              <a:t>returnType</a:t>
+            </a:r>
+            <a:r>
+              <a:rPr lang="en-US" dirty="0" smtClean="0">
+                <a:solidFill>
+                  <a:schemeClr val="accent4"/>
+                </a:solidFill>
+              </a:rPr>
+              <a:t> </a:t>
+            </a:r>
+            <a:r>
+              <a:rPr lang="en-US" dirty="0" err="1" smtClean="0">
+                <a:solidFill>
+                  <a:schemeClr val="accent4"/>
+                </a:solidFill>
+              </a:rPr>
+              <a:t>functionName</a:t>
+            </a:r>
+            <a:r>
+              <a:rPr lang="en-US" dirty="0" smtClean="0">
+                <a:solidFill>
+                  <a:schemeClr val="accent4"/>
+                </a:solidFill>
+              </a:rPr>
+              <a:t>(</a:t>
+            </a:r>
+            <a:r>
+              <a:rPr lang="en-US" dirty="0" err="1" smtClean="0">
+                <a:solidFill>
+                  <a:schemeClr val="accent4"/>
+                </a:solidFill>
+              </a:rPr>
+              <a:t>paramater</a:t>
+            </a:r>
+            <a:r>
+              <a:rPr lang="en-US" dirty="0" smtClean="0">
+                <a:solidFill>
+                  <a:schemeClr val="accent4"/>
+                </a:solidFill>
+              </a:rPr>
+              <a:t>)</a:t>
+            </a:r>
+          </a:p>
+          <a:p>
+            <a:pPr lvl="1"/>
+            <a:r>
+              <a:rPr lang="en-US" dirty="0" err="1" smtClean="0"/>
+              <a:t>returnType</a:t>
+            </a:r>
+            <a:r>
+              <a:rPr lang="en-US" dirty="0" smtClean="0"/>
+              <a:t> can be either a </a:t>
+            </a:r>
+            <a:r>
+              <a:rPr lang="en-US" dirty="0" err="1" smtClean="0"/>
+              <a:t>dataType</a:t>
+            </a:r>
+            <a:r>
+              <a:rPr lang="en-US" dirty="0" smtClean="0"/>
+              <a:t> or void</a:t>
+            </a:r>
+          </a:p>
+          <a:p>
+            <a:pPr lvl="1"/>
+            <a:r>
+              <a:rPr lang="en-US" dirty="0" err="1" smtClean="0"/>
+              <a:t>Paramater</a:t>
+            </a:r>
+            <a:r>
+              <a:rPr lang="en-US" dirty="0" smtClean="0"/>
+              <a:t> is optional, but there can be more than one of them</a:t>
+            </a:r>
+          </a:p>
+          <a:p>
+            <a:pPr lvl="1"/>
+            <a:r>
+              <a:rPr lang="en-US" dirty="0" err="1" smtClean="0"/>
+              <a:t>Paramater</a:t>
+            </a:r>
+            <a:r>
+              <a:rPr lang="en-US" dirty="0" smtClean="0"/>
+              <a:t> denotes : </a:t>
+            </a:r>
+            <a:r>
+              <a:rPr lang="en-US" dirty="0" err="1" smtClean="0"/>
+              <a:t>dataType</a:t>
+            </a:r>
+            <a:r>
+              <a:rPr lang="en-US" dirty="0" smtClean="0"/>
+              <a:t> </a:t>
+            </a:r>
+            <a:r>
+              <a:rPr lang="en-US" dirty="0" err="1" smtClean="0"/>
+              <a:t>variableName</a:t>
+            </a:r>
+            <a:endParaRPr lang="en-US" dirty="0"/>
+          </a:p>
+        </p:txBody>
+      </p:sp>
+    </p:spTree>
+    <p:extLst>
+      <p:ext uri="{BB962C8B-B14F-4D97-AF65-F5344CB8AC3E}">
+        <p14:creationId xmlns:p14="http://schemas.microsoft.com/office/powerpoint/2010/main" val="1900441109"/>
+      </p:ext>
+    </p:extLst>
+  </p:cSld>
+  <p:clrMapOvr>
+    <a:masterClrMapping/>
+  </p:clrMapOvr>
+  <p:timing>
+    <p:tnLst>
+      <p:par>
+        <p:cTn xmlns:p14="http://schemas.microsoft.com/office/powerpoint/2010/main" id="1" dur="indefinite" restart="never" nodeType="tmRoot"/>
+      </p:par>
+    </p:tnLst>
+  </p:timing>
+</p:sld>
+</file>
+
+<file path=ppt/slides/slide26.xml><?xml version="1.0" encoding="utf-8"?>
+<p:sld xmlns:a="http://schemas.openxmlformats.org/drawingml/2006/main" xmlns:r="http://schemas.openxmlformats.org/officeDocument/2006/relationships" xmlns:p="http://schemas.openxmlformats.org/presentationml/2006/main">
+  <p:cSld>
+    <p:spTree>
+      <p:nvGrpSpPr>
+        <p:cNvPr id="1" name=""/>
+        <p:cNvGrpSpPr/>
+        <p:nvPr/>
+      </p:nvGrpSpPr>
+      <p:grpSpPr>
+        <a:xfrm>
+          <a:off x="0" y="0"/>
+          <a:ext cx="0" cy="0"/>
+          <a:chOff x="0" y="0"/>
+          <a:chExt cx="0" cy="0"/>
+        </a:xfrm>
+      </p:grpSpPr>
+      <p:sp>
+        <p:nvSpPr>
+          <p:cNvPr id="2" name="Title 1"/>
+          <p:cNvSpPr>
+            <a:spLocks noGrp="1"/>
+          </p:cNvSpPr>
+          <p:nvPr>
+            <p:ph type="title"/>
+          </p:nvPr>
+        </p:nvSpPr>
+        <p:spPr/>
+        <p:txBody>
+          <a:bodyPr/>
+          <a:lstStyle/>
+          <a:p>
+            <a:r>
+              <a:rPr lang="en-US" dirty="0" smtClean="0"/>
+              <a:t>Functions </a:t>
+            </a:r>
+            <a:r>
+              <a:rPr lang="en-US" dirty="0" err="1" smtClean="0"/>
+              <a:t>Cont</a:t>
+            </a:r>
+            <a:endParaRPr lang="en-US" dirty="0"/>
+          </a:p>
+        </p:txBody>
+      </p:sp>
+      <p:sp>
+        <p:nvSpPr>
+          <p:cNvPr id="3" name="Content Placeholder 2"/>
+          <p:cNvSpPr>
+            <a:spLocks noGrp="1"/>
+          </p:cNvSpPr>
+          <p:nvPr>
+            <p:ph idx="1"/>
+          </p:nvPr>
+        </p:nvSpPr>
+        <p:spPr/>
+        <p:txBody>
+          <a:bodyPr/>
+          <a:lstStyle/>
+          <a:p>
+            <a:r>
+              <a:rPr lang="en-US" dirty="0" smtClean="0"/>
+              <a:t>What is a prototype?</a:t>
+            </a:r>
+          </a:p>
+          <a:p>
+            <a:pPr lvl="1"/>
+            <a:r>
+              <a:rPr lang="en-US" dirty="0" smtClean="0"/>
+              <a:t>Think of a prototype as a promise you make to the computer.</a:t>
+            </a:r>
+          </a:p>
+          <a:p>
+            <a:pPr lvl="1"/>
+            <a:r>
+              <a:rPr lang="en-US" dirty="0" smtClean="0"/>
+              <a:t>The name of the function (as specified in the prototype) identifies the promise</a:t>
+            </a:r>
+          </a:p>
+          <a:p>
+            <a:pPr lvl="1"/>
+            <a:r>
+              <a:rPr lang="en-US" dirty="0" smtClean="0"/>
+              <a:t>The parameters are what is needed for the promise to be fulfilled</a:t>
+            </a:r>
+          </a:p>
+          <a:p>
+            <a:pPr lvl="1"/>
+            <a:r>
+              <a:rPr lang="en-US" dirty="0" smtClean="0"/>
+              <a:t>The return type is what you get back after you fulfilled the promise</a:t>
+            </a:r>
+            <a:endParaRPr lang="en-US" dirty="0"/>
+          </a:p>
+        </p:txBody>
+      </p:sp>
+    </p:spTree>
+    <p:extLst>
+      <p:ext uri="{BB962C8B-B14F-4D97-AF65-F5344CB8AC3E}">
+        <p14:creationId xmlns:p14="http://schemas.microsoft.com/office/powerpoint/2010/main" val="121991919"/>
+      </p:ext>
+    </p:extLst>
+  </p:cSld>
+  <p:clrMapOvr>
+    <a:masterClrMapping/>
+  </p:clrMapOvr>
+  <p:timing>
+    <p:tnLst>
+      <p:par>
+        <p:cTn xmlns:p14="http://schemas.microsoft.com/office/powerpoint/2010/main" id="1" dur="indefinite" restart="never" nodeType="tmRoot"/>
+      </p:par>
+    </p:tnLst>
+  </p:timing>
+</p:sld>
+</file>
+
+<file path=ppt/slides/slide27.xml><?xml version="1.0" encoding="utf-8"?>
+<p:sld xmlns:a="http://schemas.openxmlformats.org/drawingml/2006/main" xmlns:r="http://schemas.openxmlformats.org/officeDocument/2006/relationships" xmlns:p="http://schemas.openxmlformats.org/presentationml/2006/main">
+  <p:cSld>
+    <p:spTree>
+      <p:nvGrpSpPr>
+        <p:cNvPr id="1" name=""/>
+        <p:cNvGrpSpPr/>
+        <p:nvPr/>
+      </p:nvGrpSpPr>
+      <p:grpSpPr>
+        <a:xfrm>
+          <a:off x="0" y="0"/>
+          <a:ext cx="0" cy="0"/>
+          <a:chOff x="0" y="0"/>
+          <a:chExt cx="0" cy="0"/>
+        </a:xfrm>
+      </p:grpSpPr>
+      <p:sp>
+        <p:nvSpPr>
+          <p:cNvPr id="2" name="Title 1"/>
+          <p:cNvSpPr>
+            <a:spLocks noGrp="1"/>
+          </p:cNvSpPr>
+          <p:nvPr>
+            <p:ph type="title"/>
+          </p:nvPr>
+        </p:nvSpPr>
+        <p:spPr/>
+        <p:txBody>
+          <a:bodyPr/>
+          <a:lstStyle/>
+          <a:p>
+            <a:r>
+              <a:rPr lang="en-US" dirty="0" smtClean="0"/>
+              <a:t>Functions Cont.</a:t>
+            </a:r>
+            <a:endParaRPr lang="en-US" dirty="0"/>
+          </a:p>
+        </p:txBody>
+      </p:sp>
+      <p:sp>
+        <p:nvSpPr>
+          <p:cNvPr id="3" name="Content Placeholder 2"/>
+          <p:cNvSpPr>
+            <a:spLocks noGrp="1"/>
+          </p:cNvSpPr>
+          <p:nvPr>
+            <p:ph idx="1"/>
+          </p:nvPr>
+        </p:nvSpPr>
+        <p:spPr/>
+        <p:txBody>
+          <a:bodyPr>
+            <a:normAutofit lnSpcReduction="10000"/>
+          </a:bodyPr>
+          <a:lstStyle/>
+          <a:p>
+            <a:r>
+              <a:rPr lang="en-US" dirty="0" smtClean="0"/>
+              <a:t>In the real world, when you make a promise you only need to fulfill that promise once the person you made it to asks you to fulfill it or you decide to do it by yourself.</a:t>
+            </a:r>
+          </a:p>
+          <a:p>
+            <a:r>
+              <a:rPr lang="en-US" dirty="0" smtClean="0"/>
+              <a:t>When stating the promise (defining the function), you use { and } to say, the content between { and } is what will happen when the promise is fulfilled. That is, the function is called.</a:t>
+            </a:r>
+          </a:p>
+          <a:p>
+            <a:r>
+              <a:rPr lang="en-US" dirty="0" smtClean="0"/>
+              <a:t>( and ) are used to specify the parameters (preconditions to the promise being fulfilled).</a:t>
+            </a:r>
+            <a:endParaRPr lang="en-US" dirty="0"/>
+          </a:p>
+        </p:txBody>
+      </p:sp>
+    </p:spTree>
+    <p:extLst>
+      <p:ext uri="{BB962C8B-B14F-4D97-AF65-F5344CB8AC3E}">
+        <p14:creationId xmlns:p14="http://schemas.microsoft.com/office/powerpoint/2010/main" val="538504192"/>
+      </p:ext>
+    </p:extLst>
+  </p:cSld>
+  <p:clrMapOvr>
+    <a:masterClrMapping/>
+  </p:clrMapOvr>
+  <p:timing>
+    <p:tnLst>
+      <p:par>
+        <p:cTn xmlns:p14="http://schemas.microsoft.com/office/powerpoint/2010/main" id="1" dur="indefinite" restart="never" nodeType="tmRoot"/>
+      </p:par>
+    </p:tnLst>
+  </p:timing>
+</p:sld>
+</file>
+
+<file path=ppt/slides/slide28.xml><?xml version="1.0" encoding="utf-8"?>
+<p:sld xmlns:a="http://schemas.openxmlformats.org/drawingml/2006/main" xmlns:r="http://schemas.openxmlformats.org/officeDocument/2006/relationships" xmlns:p="http://schemas.openxmlformats.org/presentationml/2006/main">
+  <p:cSld>
+    <p:spTree>
+      <p:nvGrpSpPr>
+        <p:cNvPr id="1" name=""/>
+        <p:cNvGrpSpPr/>
+        <p:nvPr/>
+      </p:nvGrpSpPr>
+      <p:grpSpPr>
+        <a:xfrm>
+          <a:off x="0" y="0"/>
+          <a:ext cx="0" cy="0"/>
+          <a:chOff x="0" y="0"/>
+          <a:chExt cx="0" cy="0"/>
+        </a:xfrm>
+      </p:grpSpPr>
+      <p:sp>
+        <p:nvSpPr>
+          <p:cNvPr id="2" name="Title 1"/>
+          <p:cNvSpPr>
+            <a:spLocks noGrp="1"/>
+          </p:cNvSpPr>
+          <p:nvPr>
+            <p:ph type="title"/>
+          </p:nvPr>
+        </p:nvSpPr>
+        <p:spPr/>
+        <p:txBody>
+          <a:bodyPr/>
+          <a:lstStyle/>
+          <a:p>
+            <a:r>
+              <a:rPr lang="en-US" dirty="0" smtClean="0"/>
+              <a:t>Functions Cont.</a:t>
+            </a:r>
+            <a:endParaRPr lang="en-US" dirty="0"/>
+          </a:p>
+        </p:txBody>
+      </p:sp>
+      <p:sp>
+        <p:nvSpPr>
+          <p:cNvPr id="3" name="Content Placeholder 2"/>
+          <p:cNvSpPr>
+            <a:spLocks noGrp="1"/>
+          </p:cNvSpPr>
+          <p:nvPr>
+            <p:ph idx="1"/>
+          </p:nvPr>
+        </p:nvSpPr>
+        <p:spPr/>
+        <p:txBody>
+          <a:bodyPr>
+            <a:normAutofit lnSpcReduction="10000"/>
+          </a:bodyPr>
+          <a:lstStyle/>
+          <a:p>
+            <a:r>
+              <a:rPr lang="en-US" dirty="0" smtClean="0"/>
+              <a:t>Back to a more technical view, by declaring a prototype you tell the compiler that there exists a function identified by the function name.</a:t>
+            </a:r>
+          </a:p>
+          <a:p>
+            <a:r>
+              <a:rPr lang="en-US" dirty="0" smtClean="0"/>
+              <a:t>To call the function, you use the function name together with the () with optional parameters separated by a set of “ , ”.</a:t>
+            </a:r>
+          </a:p>
+          <a:p>
+            <a:r>
+              <a:rPr lang="en-US" dirty="0" smtClean="0"/>
+              <a:t>One needs to implement a function at some time though. If a function isn’t implemented and the compiler was promised that function, a compiler error will occur.</a:t>
+            </a:r>
+            <a:endParaRPr lang="en-US" dirty="0"/>
+          </a:p>
+        </p:txBody>
+      </p:sp>
+    </p:spTree>
+    <p:extLst>
+      <p:ext uri="{BB962C8B-B14F-4D97-AF65-F5344CB8AC3E}">
+        <p14:creationId xmlns:p14="http://schemas.microsoft.com/office/powerpoint/2010/main" val="1038671092"/>
+      </p:ext>
+    </p:extLst>
+  </p:cSld>
+  <p:clrMapOvr>
+    <a:masterClrMapping/>
+  </p:clrMapOvr>
+  <p:timing>
+    <p:tnLst>
+      <p:par>
+        <p:cTn xmlns:p14="http://schemas.microsoft.com/office/powerpoint/2010/main" id="1" dur="indefinite" restart="never" nodeType="tmRoot"/>
+      </p:par>
+    </p:tnLst>
+  </p:timing>
+</p:sld>
+</file>
+
+<file path=ppt/slides/slide29.xml><?xml version="1.0" encoding="utf-8"?>
+<p:sld xmlns:a="http://schemas.openxmlformats.org/drawingml/2006/main" xmlns:r="http://schemas.openxmlformats.org/officeDocument/2006/relationships" xmlns:p="http://schemas.openxmlformats.org/presentationml/2006/main">
+  <p:cSld>
+    <p:spTree>
+      <p:nvGrpSpPr>
+        <p:cNvPr id="1" name=""/>
+        <p:cNvGrpSpPr/>
+        <p:nvPr/>
+      </p:nvGrpSpPr>
+      <p:grpSpPr>
+        <a:xfrm>
+          <a:off x="0" y="0"/>
+          <a:ext cx="0" cy="0"/>
+          <a:chOff x="0" y="0"/>
+          <a:chExt cx="0" cy="0"/>
+        </a:xfrm>
+      </p:grpSpPr>
+      <p:sp>
+        <p:nvSpPr>
+          <p:cNvPr id="2" name="Title 1"/>
+          <p:cNvSpPr>
+            <a:spLocks noGrp="1"/>
+          </p:cNvSpPr>
+          <p:nvPr>
+            <p:ph type="title"/>
+          </p:nvPr>
+        </p:nvSpPr>
+        <p:spPr/>
+        <p:txBody>
+          <a:bodyPr/>
+          <a:lstStyle/>
+          <a:p>
+            <a:r>
+              <a:rPr lang="en-US" dirty="0" smtClean="0"/>
+              <a:t>Functions Cont.</a:t>
+            </a:r>
+            <a:endParaRPr lang="en-US" dirty="0"/>
+          </a:p>
+        </p:txBody>
+      </p:sp>
+      <p:sp>
+        <p:nvSpPr>
+          <p:cNvPr id="3" name="Content Placeholder 2"/>
+          <p:cNvSpPr>
+            <a:spLocks noGrp="1"/>
+          </p:cNvSpPr>
+          <p:nvPr>
+            <p:ph idx="1"/>
+          </p:nvPr>
+        </p:nvSpPr>
+        <p:spPr/>
+        <p:txBody>
+          <a:bodyPr/>
+          <a:lstStyle/>
+          <a:p>
+            <a:r>
+              <a:rPr lang="en-US" dirty="0" smtClean="0"/>
+              <a:t>Phew. That was quite a bit. Let’s look at some code:</a:t>
+            </a:r>
+          </a:p>
+          <a:p>
+            <a:pPr lvl="1"/>
+            <a:r>
+              <a:rPr lang="en-US" dirty="0" smtClean="0">
+                <a:cs typeface="Apple Chancery"/>
+              </a:rPr>
+              <a:t>Example: </a:t>
+            </a:r>
+            <a:r>
+              <a:rPr lang="en-US" dirty="0" err="1" smtClean="0">
+                <a:latin typeface="Apple Chancery"/>
+                <a:cs typeface="Apple Chancery"/>
+              </a:rPr>
+              <a:t>Func.cpp</a:t>
+            </a:r>
+            <a:endParaRPr lang="en-US" dirty="0" smtClean="0">
+              <a:cs typeface="Apple Chancery"/>
+            </a:endParaRPr>
+          </a:p>
+          <a:p>
+            <a:r>
+              <a:rPr lang="en-US" dirty="0" smtClean="0">
+                <a:cs typeface="Apple Chancery"/>
+              </a:rPr>
+              <a:t>By now you should know, there are MANY different ways of implementing functions.</a:t>
+            </a:r>
+          </a:p>
+        </p:txBody>
+      </p:sp>
+    </p:spTree>
+    <p:extLst>
+      <p:ext uri="{BB962C8B-B14F-4D97-AF65-F5344CB8AC3E}">
+        <p14:creationId xmlns:p14="http://schemas.microsoft.com/office/powerpoint/2010/main" val="1806558736"/>
+      </p:ext>
+    </p:extLst>
+  </p:cSld>
+  <p:clrMapOvr>
+    <a:masterClrMapping/>
+  </p:clrMapOvr>
+  <p:timing>
+    <p:tnLst>
+      <p:par>
+        <p:cTn xmlns:p14="http://schemas.microsoft.com/office/powerpoint/2010/main" id="1" dur="indefinite" restart="never" nodeType="tmRoot"/>
+      </p:par>
+    </p:tnLst>
+  </p:timing>
+</p:sld>
+</file>
+
+<file path=ppt/slides/slide3.xml><?xml version="1.0" encoding="utf-8"?>
+<p:sld xmlns:a="http://schemas.openxmlformats.org/drawingml/2006/main" xmlns:r="http://schemas.openxmlformats.org/officeDocument/2006/relationships" xmlns:p="http://schemas.openxmlformats.org/presentationml/2006/main">
+  <p:cSld>
+    <p:spTree>
+      <p:nvGrpSpPr>
+        <p:cNvPr id="1" name=""/>
+        <p:cNvGrpSpPr/>
+        <p:nvPr/>
+      </p:nvGrpSpPr>
+      <p:grpSpPr>
+        <a:xfrm>
+          <a:off x="0" y="0"/>
+          <a:ext cx="0" cy="0"/>
+          <a:chOff x="0" y="0"/>
+          <a:chExt cx="0" cy="0"/>
+        </a:xfrm>
+      </p:grpSpPr>
+      <p:sp>
+        <p:nvSpPr>
+          <p:cNvPr id="2" name="Title 1"/>
+          <p:cNvSpPr>
+            <a:spLocks noGrp="1"/>
+          </p:cNvSpPr>
+          <p:nvPr>
+            <p:ph type="title"/>
+          </p:nvPr>
+        </p:nvSpPr>
+        <p:spPr/>
+        <p:txBody>
+          <a:bodyPr/>
+          <a:lstStyle/>
+          <a:p>
+            <a:r>
+              <a:rPr lang="en-US" dirty="0" smtClean="0"/>
+              <a:t>Data Types</a:t>
+            </a:r>
+            <a:endParaRPr lang="en-US" dirty="0"/>
+          </a:p>
+        </p:txBody>
+      </p:sp>
+      <p:sp>
+        <p:nvSpPr>
+          <p:cNvPr id="3" name="Content Placeholder 2"/>
+          <p:cNvSpPr>
+            <a:spLocks noGrp="1"/>
+          </p:cNvSpPr>
+          <p:nvPr>
+            <p:ph idx="1"/>
+          </p:nvPr>
+        </p:nvSpPr>
+        <p:spPr/>
+        <p:txBody>
+          <a:bodyPr/>
+          <a:lstStyle/>
+          <a:p>
+            <a:r>
+              <a:rPr lang="en-US" dirty="0" smtClean="0"/>
+              <a:t>C++ is a “</a:t>
+            </a:r>
+            <a:r>
+              <a:rPr lang="en-US" dirty="0"/>
+              <a:t>s</a:t>
+            </a:r>
+            <a:r>
+              <a:rPr lang="en-US" dirty="0" smtClean="0"/>
+              <a:t>trongly typed” programming language. What does it mean if a language is strongly typed?</a:t>
+            </a:r>
+          </a:p>
+          <a:p>
+            <a:r>
+              <a:rPr lang="en-US" dirty="0" smtClean="0"/>
+              <a:t>What is the difference between data types?</a:t>
+            </a:r>
+          </a:p>
+          <a:p>
+            <a:pPr lvl="1"/>
+            <a:r>
+              <a:rPr lang="en-US" dirty="0" smtClean="0"/>
+              <a:t>Size of data type</a:t>
+            </a:r>
+          </a:p>
+          <a:p>
+            <a:pPr lvl="1"/>
+            <a:r>
+              <a:rPr lang="en-US" dirty="0" smtClean="0"/>
+              <a:t>Representation inside the computer</a:t>
+            </a:r>
+          </a:p>
+          <a:p>
+            <a:endParaRPr lang="en-US" dirty="0"/>
+          </a:p>
+          <a:p>
+            <a:r>
+              <a:rPr lang="en-US" dirty="0" smtClean="0"/>
+              <a:t>See</a:t>
+            </a:r>
+            <a:r>
+              <a:rPr lang="en-US" dirty="0" smtClean="0">
+                <a:latin typeface="Apple Chancery"/>
+                <a:cs typeface="Apple Chancery"/>
+              </a:rPr>
+              <a:t> </a:t>
+            </a:r>
+            <a:r>
+              <a:rPr lang="en-US" dirty="0" err="1" smtClean="0">
+                <a:latin typeface="Apple Chancery"/>
+                <a:cs typeface="Apple Chancery"/>
+              </a:rPr>
+              <a:t>dt.cpp</a:t>
+            </a:r>
+            <a:endParaRPr lang="en-US" dirty="0" smtClean="0">
+              <a:latin typeface="Apple Chancery"/>
+              <a:cs typeface="Apple Chancery"/>
+            </a:endParaRPr>
+          </a:p>
+        </p:txBody>
+      </p:sp>
+    </p:spTree>
+    <p:extLst>
+      <p:ext uri="{BB962C8B-B14F-4D97-AF65-F5344CB8AC3E}">
+        <p14:creationId xmlns:p14="http://schemas.microsoft.com/office/powerpoint/2010/main" val="2466426721"/>
+      </p:ext>
+    </p:extLst>
+  </p:cSld>
+  <p:clrMapOvr>
+    <a:masterClrMapping/>
+  </p:clrMapOvr>
+  <p:timing>
+    <p:tnLst>
+      <p:par>
+        <p:cTn xmlns:p14="http://schemas.microsoft.com/office/powerpoint/2010/main" id="1" dur="indefinite" restart="never" nodeType="tmRoot"/>
+      </p:par>
+    </p:tnLst>
+  </p:timing>
+</p:sld>
+</file>
+
+<file path=ppt/slides/slide30.xml><?xml version="1.0" encoding="utf-8"?>
+<p:sld xmlns:a="http://schemas.openxmlformats.org/drawingml/2006/main" xmlns:r="http://schemas.openxmlformats.org/officeDocument/2006/relationships" xmlns:p="http://schemas.openxmlformats.org/presentationml/2006/main">
+  <p:cSld>
+    <p:spTree>
+      <p:nvGrpSpPr>
+        <p:cNvPr id="1" name=""/>
+        <p:cNvGrpSpPr/>
+        <p:nvPr/>
+      </p:nvGrpSpPr>
+      <p:grpSpPr>
+        <a:xfrm>
+          <a:off x="0" y="0"/>
+          <a:ext cx="0" cy="0"/>
+          <a:chOff x="0" y="0"/>
+          <a:chExt cx="0" cy="0"/>
+        </a:xfrm>
+      </p:grpSpPr>
+      <p:sp>
+        <p:nvSpPr>
+          <p:cNvPr id="2" name="Title 1"/>
+          <p:cNvSpPr>
+            <a:spLocks noGrp="1"/>
+          </p:cNvSpPr>
+          <p:nvPr>
+            <p:ph type="title"/>
+          </p:nvPr>
+        </p:nvSpPr>
+        <p:spPr/>
+        <p:txBody>
+          <a:bodyPr/>
+          <a:lstStyle/>
+          <a:p>
+            <a:r>
+              <a:rPr lang="en-US" dirty="0" smtClean="0"/>
+              <a:t>Program Layout</a:t>
+            </a:r>
+            <a:endParaRPr lang="en-US" dirty="0"/>
+          </a:p>
+        </p:txBody>
+      </p:sp>
+      <p:sp>
+        <p:nvSpPr>
+          <p:cNvPr id="3" name="Content Placeholder 2"/>
+          <p:cNvSpPr>
+            <a:spLocks noGrp="1"/>
+          </p:cNvSpPr>
+          <p:nvPr>
+            <p:ph idx="1"/>
+          </p:nvPr>
+        </p:nvSpPr>
+        <p:spPr/>
+        <p:txBody>
+          <a:bodyPr>
+            <a:normAutofit fontScale="92500"/>
+          </a:bodyPr>
+          <a:lstStyle/>
+          <a:p>
+            <a:r>
+              <a:rPr lang="en-US" dirty="0" smtClean="0"/>
+              <a:t>A quick word on where to implement your functions.</a:t>
+            </a:r>
+          </a:p>
+          <a:p>
+            <a:r>
+              <a:rPr lang="en-US" dirty="0" smtClean="0"/>
+              <a:t>.h files are called “Header files”, these normally contain all the prototypes (and later on, class definitions)</a:t>
+            </a:r>
+          </a:p>
+          <a:p>
+            <a:r>
+              <a:rPr lang="en-US" dirty="0" smtClean="0"/>
+              <a:t>.</a:t>
+            </a:r>
+            <a:r>
+              <a:rPr lang="en-US" dirty="0" err="1" smtClean="0"/>
+              <a:t>cpp</a:t>
+            </a:r>
+            <a:r>
+              <a:rPr lang="en-US" dirty="0" smtClean="0"/>
+              <a:t> files are called implementation files, and should contain the implementation of the prototypes</a:t>
+            </a:r>
+          </a:p>
+          <a:p>
+            <a:r>
+              <a:rPr lang="en-US" dirty="0" smtClean="0"/>
+              <a:t>Any C++ program needs at least one .</a:t>
+            </a:r>
+            <a:r>
+              <a:rPr lang="en-US" dirty="0" err="1" smtClean="0"/>
+              <a:t>cpp</a:t>
+            </a:r>
+            <a:r>
+              <a:rPr lang="en-US" dirty="0" smtClean="0"/>
+              <a:t> file with a </a:t>
+            </a:r>
+            <a:r>
+              <a:rPr lang="en-US" dirty="0" err="1" smtClean="0">
+                <a:solidFill>
+                  <a:schemeClr val="accent4"/>
+                </a:solidFill>
+              </a:rPr>
+              <a:t>int</a:t>
+            </a:r>
+            <a:r>
+              <a:rPr lang="en-US" dirty="0" smtClean="0">
+                <a:solidFill>
+                  <a:schemeClr val="accent4"/>
+                </a:solidFill>
+              </a:rPr>
+              <a:t> main(){…some code… return </a:t>
+            </a:r>
+            <a:r>
+              <a:rPr lang="en-US" dirty="0" err="1" smtClean="0">
+                <a:solidFill>
+                  <a:schemeClr val="accent4"/>
+                </a:solidFill>
+              </a:rPr>
+              <a:t>someInt</a:t>
+            </a:r>
+            <a:r>
+              <a:rPr lang="en-US" dirty="0" smtClean="0">
+                <a:solidFill>
+                  <a:schemeClr val="accent4"/>
+                </a:solidFill>
+              </a:rPr>
+              <a:t>;} </a:t>
+            </a:r>
+          </a:p>
+          <a:p>
+            <a:r>
+              <a:rPr lang="en-US" dirty="0" smtClean="0"/>
+              <a:t>This is called the program’s entry point</a:t>
+            </a:r>
+            <a:endParaRPr lang="en-US" dirty="0"/>
+          </a:p>
+        </p:txBody>
+      </p:sp>
+    </p:spTree>
+    <p:extLst>
+      <p:ext uri="{BB962C8B-B14F-4D97-AF65-F5344CB8AC3E}">
+        <p14:creationId xmlns:p14="http://schemas.microsoft.com/office/powerpoint/2010/main" val="3735837056"/>
+      </p:ext>
+    </p:extLst>
+  </p:cSld>
+  <p:clrMapOvr>
+    <a:masterClrMapping/>
+  </p:clrMapOvr>
+  <p:timing>
+    <p:tnLst>
+      <p:par>
+        <p:cTn xmlns:p14="http://schemas.microsoft.com/office/powerpoint/2010/main" id="1" dur="indefinite" restart="never" nodeType="tmRoot"/>
+      </p:par>
+    </p:tnLst>
+  </p:timing>
+</p:sld>
+</file>
+
+<file path=ppt/slides/slide31.xml><?xml version="1.0" encoding="utf-8"?>
+<p:sld xmlns:a="http://schemas.openxmlformats.org/drawingml/2006/main" xmlns:r="http://schemas.openxmlformats.org/officeDocument/2006/relationships" xmlns:p="http://schemas.openxmlformats.org/presentationml/2006/main">
+  <p:cSld>
+    <p:spTree>
+      <p:nvGrpSpPr>
+        <p:cNvPr id="1" name=""/>
+        <p:cNvGrpSpPr/>
+        <p:nvPr/>
+      </p:nvGrpSpPr>
+      <p:grpSpPr>
+        <a:xfrm>
+          <a:off x="0" y="0"/>
+          <a:ext cx="0" cy="0"/>
+          <a:chOff x="0" y="0"/>
+          <a:chExt cx="0" cy="0"/>
+        </a:xfrm>
+      </p:grpSpPr>
+      <p:sp>
+        <p:nvSpPr>
+          <p:cNvPr id="2" name="Title 1"/>
+          <p:cNvSpPr>
+            <a:spLocks noGrp="1"/>
+          </p:cNvSpPr>
+          <p:nvPr>
+            <p:ph type="title"/>
+          </p:nvPr>
+        </p:nvSpPr>
+        <p:spPr/>
+        <p:txBody>
+          <a:bodyPr/>
+          <a:lstStyle/>
+          <a:p>
+            <a:r>
+              <a:rPr lang="en-US" dirty="0" smtClean="0"/>
+              <a:t>Program Layout</a:t>
+            </a:r>
+            <a:endParaRPr lang="en-US" dirty="0"/>
+          </a:p>
+        </p:txBody>
+      </p:sp>
+      <p:sp>
+        <p:nvSpPr>
+          <p:cNvPr id="3" name="Content Placeholder 2"/>
+          <p:cNvSpPr>
+            <a:spLocks noGrp="1"/>
+          </p:cNvSpPr>
+          <p:nvPr>
+            <p:ph idx="1"/>
+          </p:nvPr>
+        </p:nvSpPr>
+        <p:spPr/>
+        <p:txBody>
+          <a:bodyPr>
+            <a:normAutofit lnSpcReduction="10000"/>
+          </a:bodyPr>
+          <a:lstStyle/>
+          <a:p>
+            <a:r>
+              <a:rPr lang="en-US" dirty="0" smtClean="0"/>
+              <a:t>In order to better understand the layout, think of </a:t>
+            </a:r>
+            <a:r>
+              <a:rPr lang="en-US" dirty="0" smtClean="0">
+                <a:solidFill>
+                  <a:schemeClr val="accent4"/>
+                </a:solidFill>
+              </a:rPr>
+              <a:t>#include </a:t>
+            </a:r>
+            <a:r>
+              <a:rPr lang="en-US" dirty="0" smtClean="0">
+                <a:solidFill>
+                  <a:srgbClr val="FFFFFF"/>
+                </a:solidFill>
+              </a:rPr>
+              <a:t>as simply saying, take the file and copy it, then highlight me and paste.</a:t>
+            </a:r>
+          </a:p>
+          <a:p>
+            <a:r>
+              <a:rPr lang="en-US" dirty="0" smtClean="0">
+                <a:solidFill>
+                  <a:srgbClr val="FFFFFF"/>
+                </a:solidFill>
+              </a:rPr>
+              <a:t>Examples:</a:t>
+            </a:r>
+          </a:p>
+          <a:p>
+            <a:pPr lvl="1"/>
+            <a:r>
+              <a:rPr lang="en-US" dirty="0" err="1" smtClean="0">
+                <a:solidFill>
+                  <a:srgbClr val="FFFFFF"/>
+                </a:solidFill>
+                <a:latin typeface="Apple Chancery"/>
+                <a:cs typeface="Apple Chancery"/>
+              </a:rPr>
+              <a:t>Main.cpp</a:t>
+            </a:r>
+            <a:endParaRPr lang="en-US" dirty="0" smtClean="0">
+              <a:solidFill>
+                <a:srgbClr val="FFFFFF"/>
+              </a:solidFill>
+              <a:latin typeface="Apple Chancery"/>
+              <a:cs typeface="Apple Chancery"/>
+            </a:endParaRPr>
+          </a:p>
+          <a:p>
+            <a:pPr lvl="1"/>
+            <a:r>
+              <a:rPr lang="en-US" dirty="0" err="1" smtClean="0">
+                <a:solidFill>
+                  <a:srgbClr val="FFFFFF"/>
+                </a:solidFill>
+                <a:latin typeface="Apple Chancery"/>
+                <a:cs typeface="Apple Chancery"/>
+              </a:rPr>
+              <a:t>Foo.cpp</a:t>
+            </a:r>
+            <a:endParaRPr lang="en-US" dirty="0" smtClean="0">
+              <a:solidFill>
+                <a:srgbClr val="FFFFFF"/>
+              </a:solidFill>
+              <a:latin typeface="Apple Chancery"/>
+              <a:cs typeface="Apple Chancery"/>
+            </a:endParaRPr>
+          </a:p>
+          <a:p>
+            <a:pPr lvl="1"/>
+            <a:r>
+              <a:rPr lang="en-US" dirty="0" err="1" smtClean="0">
+                <a:solidFill>
+                  <a:srgbClr val="FFFFFF"/>
+                </a:solidFill>
+                <a:latin typeface="Apple Chancery"/>
+                <a:cs typeface="Apple Chancery"/>
+              </a:rPr>
+              <a:t>Foo.h</a:t>
+            </a:r>
+            <a:endParaRPr lang="en-US" dirty="0" smtClean="0">
+              <a:solidFill>
+                <a:srgbClr val="FFFFFF"/>
+              </a:solidFill>
+              <a:latin typeface="Apple Chancery"/>
+              <a:cs typeface="Apple Chancery"/>
+            </a:endParaRPr>
+          </a:p>
+          <a:p>
+            <a:r>
+              <a:rPr lang="en-US" dirty="0" smtClean="0">
+                <a:solidFill>
+                  <a:srgbClr val="FFFFFF"/>
+                </a:solidFill>
+                <a:cs typeface="Apple Chancery"/>
+              </a:rPr>
+              <a:t>Remember to compile all the .</a:t>
+            </a:r>
+            <a:r>
+              <a:rPr lang="en-US" dirty="0" err="1" smtClean="0">
+                <a:solidFill>
+                  <a:srgbClr val="FFFFFF"/>
+                </a:solidFill>
+                <a:cs typeface="Apple Chancery"/>
+              </a:rPr>
+              <a:t>cpp’s</a:t>
+            </a:r>
+            <a:r>
+              <a:rPr lang="en-US" dirty="0" smtClean="0">
+                <a:solidFill>
+                  <a:srgbClr val="FFFFFF"/>
+                </a:solidFill>
+                <a:cs typeface="Apple Chancery"/>
+              </a:rPr>
+              <a:t>, what happens if you don’t?</a:t>
+            </a:r>
+          </a:p>
+        </p:txBody>
+      </p:sp>
+    </p:spTree>
+    <p:extLst>
+      <p:ext uri="{BB962C8B-B14F-4D97-AF65-F5344CB8AC3E}">
+        <p14:creationId xmlns:p14="http://schemas.microsoft.com/office/powerpoint/2010/main" val="1350777141"/>
+      </p:ext>
+    </p:extLst>
+  </p:cSld>
+  <p:clrMapOvr>
+    <a:masterClrMapping/>
+  </p:clrMapOvr>
+  <p:timing>
+    <p:tnLst>
+      <p:par>
+        <p:cTn xmlns:p14="http://schemas.microsoft.com/office/powerpoint/2010/main" id="1" dur="indefinite" restart="never" nodeType="tmRoot"/>
+      </p:par>
+    </p:tnLst>
+  </p:timing>
+</p:sld>
+</file>
+
+<file path=ppt/slides/slide32.xml><?xml version="1.0" encoding="utf-8"?>
+<p:sld xmlns:a="http://schemas.openxmlformats.org/drawingml/2006/main" xmlns:r="http://schemas.openxmlformats.org/officeDocument/2006/relationships" xmlns:p="http://schemas.openxmlformats.org/presentationml/2006/main">
+  <p:cSld>
+    <p:spTree>
+      <p:nvGrpSpPr>
+        <p:cNvPr id="1" name=""/>
+        <p:cNvGrpSpPr/>
+        <p:nvPr/>
+      </p:nvGrpSpPr>
+      <p:grpSpPr>
+        <a:xfrm>
+          <a:off x="0" y="0"/>
+          <a:ext cx="0" cy="0"/>
+          <a:chOff x="0" y="0"/>
+          <a:chExt cx="0" cy="0"/>
+        </a:xfrm>
+      </p:grpSpPr>
+      <p:sp>
+        <p:nvSpPr>
+          <p:cNvPr id="2" name="Title 1"/>
+          <p:cNvSpPr>
+            <a:spLocks noGrp="1"/>
+          </p:cNvSpPr>
+          <p:nvPr>
+            <p:ph type="title"/>
+          </p:nvPr>
+        </p:nvSpPr>
+        <p:spPr/>
+        <p:txBody>
+          <a:bodyPr/>
+          <a:lstStyle/>
+          <a:p>
+            <a:r>
+              <a:rPr lang="en-US" dirty="0" smtClean="0"/>
+              <a:t>Tips for Fitch Fork</a:t>
+            </a:r>
+            <a:endParaRPr lang="en-US" dirty="0"/>
+          </a:p>
+        </p:txBody>
+      </p:sp>
+      <p:sp>
+        <p:nvSpPr>
+          <p:cNvPr id="3" name="Content Placeholder 2"/>
+          <p:cNvSpPr>
+            <a:spLocks noGrp="1"/>
+          </p:cNvSpPr>
+          <p:nvPr>
+            <p:ph idx="1"/>
+          </p:nvPr>
+        </p:nvSpPr>
+        <p:spPr>
+          <a:xfrm>
+            <a:off x="779462" y="1882588"/>
+            <a:ext cx="7581901" cy="4534254"/>
+          </a:xfrm>
+        </p:spPr>
+        <p:txBody>
+          <a:bodyPr>
+            <a:normAutofit lnSpcReduction="10000"/>
+          </a:bodyPr>
+          <a:lstStyle/>
+          <a:p>
+            <a:r>
+              <a:rPr lang="en-US" dirty="0" smtClean="0"/>
+              <a:t>Why do I get a -1?</a:t>
+            </a:r>
+          </a:p>
+          <a:p>
+            <a:pPr lvl="1"/>
+            <a:r>
+              <a:rPr lang="en-US" dirty="0" smtClean="0"/>
+              <a:t>-1 means that an ERROR occurred. You get two types of errors:</a:t>
+            </a:r>
+          </a:p>
+          <a:p>
+            <a:pPr lvl="2"/>
+            <a:r>
+              <a:rPr lang="en-US" dirty="0" smtClean="0"/>
+              <a:t>Compiler Errors: There is a problem with your C++ syntax</a:t>
+            </a:r>
+          </a:p>
+          <a:p>
+            <a:pPr lvl="2"/>
+            <a:r>
+              <a:rPr lang="en-US" dirty="0" smtClean="0"/>
+              <a:t>Runtime Errors: Something bad happened while running. Ever seen SEGMENTATION FUALT? Remember pointers?</a:t>
+            </a:r>
+          </a:p>
+          <a:p>
+            <a:r>
+              <a:rPr lang="en-US" dirty="0" smtClean="0"/>
+              <a:t>My program works on my computer, why not on </a:t>
+            </a:r>
+            <a:r>
+              <a:rPr lang="en-US" dirty="0"/>
+              <a:t>F</a:t>
+            </a:r>
+            <a:r>
+              <a:rPr lang="en-US" dirty="0" smtClean="0"/>
+              <a:t>itch </a:t>
+            </a:r>
+            <a:r>
+              <a:rPr lang="en-US" dirty="0"/>
+              <a:t>F</a:t>
+            </a:r>
+            <a:r>
+              <a:rPr lang="en-US" dirty="0" smtClean="0"/>
+              <a:t>ork?</a:t>
+            </a:r>
+          </a:p>
+          <a:p>
+            <a:pPr lvl="1"/>
+            <a:r>
+              <a:rPr lang="en-US" dirty="0" smtClean="0"/>
+              <a:t>Fitch Fork is a computer. It does a comparison,</a:t>
+            </a:r>
+          </a:p>
+          <a:p>
+            <a:pPr lvl="2"/>
+            <a:r>
+              <a:rPr lang="en-US" dirty="0" smtClean="0">
+                <a:solidFill>
+                  <a:schemeClr val="accent4"/>
+                </a:solidFill>
+              </a:rPr>
+              <a:t>If(</a:t>
+            </a:r>
+            <a:r>
+              <a:rPr lang="en-US" dirty="0" err="1" smtClean="0">
+                <a:solidFill>
+                  <a:schemeClr val="accent4"/>
+                </a:solidFill>
+              </a:rPr>
+              <a:t>yourOutput</a:t>
+            </a:r>
+            <a:r>
+              <a:rPr lang="en-US" dirty="0" smtClean="0">
+                <a:solidFill>
+                  <a:schemeClr val="accent4"/>
+                </a:solidFill>
+              </a:rPr>
+              <a:t> = </a:t>
+            </a:r>
+            <a:r>
+              <a:rPr lang="en-US" dirty="0" err="1" smtClean="0">
+                <a:solidFill>
+                  <a:schemeClr val="accent4"/>
+                </a:solidFill>
+              </a:rPr>
+              <a:t>myOuput</a:t>
+            </a:r>
+            <a:r>
+              <a:rPr lang="en-US" dirty="0" smtClean="0">
+                <a:solidFill>
+                  <a:schemeClr val="accent4"/>
+                </a:solidFill>
+              </a:rPr>
+              <a:t>) then </a:t>
+            </a:r>
+            <a:r>
+              <a:rPr lang="en-US" dirty="0" err="1" smtClean="0">
+                <a:solidFill>
+                  <a:schemeClr val="accent4"/>
+                </a:solidFill>
+              </a:rPr>
+              <a:t>youGetMarks</a:t>
+            </a:r>
+            <a:r>
+              <a:rPr lang="en-US" dirty="0" smtClean="0">
+                <a:solidFill>
+                  <a:schemeClr val="accent4"/>
+                </a:solidFill>
+              </a:rPr>
+              <a:t>();</a:t>
+            </a:r>
+          </a:p>
+          <a:p>
+            <a:pPr lvl="1"/>
+            <a:r>
+              <a:rPr lang="en-US" dirty="0" smtClean="0"/>
+              <a:t>Beloved Fitch Fork check every single character, even ones you can’t see, like \0 \n \t “ “ etc.</a:t>
+            </a:r>
+          </a:p>
+        </p:txBody>
+      </p:sp>
+    </p:spTree>
+    <p:extLst>
+      <p:ext uri="{BB962C8B-B14F-4D97-AF65-F5344CB8AC3E}">
+        <p14:creationId xmlns:p14="http://schemas.microsoft.com/office/powerpoint/2010/main" val="3282630297"/>
+      </p:ext>
+    </p:extLst>
+  </p:cSld>
+  <p:clrMapOvr>
+    <a:masterClrMapping/>
+  </p:clrMapOvr>
+  <p:timing>
+    <p:tnLst>
+      <p:par>
+        <p:cTn xmlns:p14="http://schemas.microsoft.com/office/powerpoint/2010/main" id="1" dur="indefinite" restart="never" nodeType="tmRoot"/>
+      </p:par>
+    </p:tnLst>
+  </p:timing>
+</p:sld>
+</file>
+
+<file path=ppt/slides/slide33.xml><?xml version="1.0" encoding="utf-8"?>
+<p:sld xmlns:a="http://schemas.openxmlformats.org/drawingml/2006/main" xmlns:r="http://schemas.openxmlformats.org/officeDocument/2006/relationships" xmlns:p="http://schemas.openxmlformats.org/presentationml/2006/main">
+  <p:cSld>
+    <p:spTree>
+      <p:nvGrpSpPr>
+        <p:cNvPr id="1" name=""/>
+        <p:cNvGrpSpPr/>
+        <p:nvPr/>
+      </p:nvGrpSpPr>
+      <p:grpSpPr>
+        <a:xfrm>
+          <a:off x="0" y="0"/>
+          <a:ext cx="0" cy="0"/>
+          <a:chOff x="0" y="0"/>
+          <a:chExt cx="0" cy="0"/>
+        </a:xfrm>
+      </p:grpSpPr>
+      <p:sp>
+        <p:nvSpPr>
+          <p:cNvPr id="2" name="Title 1"/>
+          <p:cNvSpPr>
+            <a:spLocks noGrp="1"/>
+          </p:cNvSpPr>
+          <p:nvPr>
+            <p:ph type="title"/>
+          </p:nvPr>
+        </p:nvSpPr>
+        <p:spPr/>
+        <p:txBody>
+          <a:bodyPr/>
+          <a:lstStyle/>
+          <a:p>
+            <a:r>
+              <a:rPr lang="en-US" dirty="0" smtClean="0"/>
+              <a:t>Conclusion</a:t>
+            </a:r>
+            <a:endParaRPr lang="en-US" dirty="0"/>
+          </a:p>
+        </p:txBody>
+      </p:sp>
+      <p:sp>
+        <p:nvSpPr>
+          <p:cNvPr id="3" name="Content Placeholder 2"/>
+          <p:cNvSpPr>
+            <a:spLocks noGrp="1"/>
+          </p:cNvSpPr>
+          <p:nvPr>
+            <p:ph idx="1"/>
+          </p:nvPr>
+        </p:nvSpPr>
+        <p:spPr/>
+        <p:txBody>
+          <a:bodyPr/>
+          <a:lstStyle/>
+          <a:p>
+            <a:r>
+              <a:rPr lang="en-US" sz="3200" dirty="0" smtClean="0"/>
+              <a:t>Thank you for attending!</a:t>
+            </a:r>
+          </a:p>
+          <a:p>
+            <a:r>
+              <a:rPr lang="en-US" sz="3200" dirty="0" smtClean="0"/>
+              <a:t>If there are any questions, please ask them now</a:t>
+            </a:r>
+            <a:r>
+              <a:rPr lang="en-US" dirty="0" smtClean="0"/>
+              <a:t>.</a:t>
+            </a:r>
+            <a:endParaRPr lang="en-US" dirty="0"/>
+          </a:p>
+        </p:txBody>
+      </p:sp>
+    </p:spTree>
+    <p:extLst>
+      <p:ext uri="{BB962C8B-B14F-4D97-AF65-F5344CB8AC3E}">
+        <p14:creationId xmlns:p14="http://schemas.microsoft.com/office/powerpoint/2010/main" val="367652040"/>
+      </p:ext>
+    </p:extLst>
+  </p:cSld>
+  <p:clrMapOvr>
+    <a:masterClrMapping/>
+  </p:clrMapOvr>
+  <p:timing>
+    <p:tnLst>
+      <p:par>
+        <p:cTn xmlns:p14="http://schemas.microsoft.com/office/powerpoint/2010/main" id="1" dur="indefinite" restart="never" nodeType="tmRoot"/>
+      </p:par>
+    </p:tnLst>
+  </p:timing>
+</p:sld>
+</file>
+
+<file path=ppt/slides/slide4.xml><?xml version="1.0" encoding="utf-8"?>
+<p:sld xmlns:a="http://schemas.openxmlformats.org/drawingml/2006/main" xmlns:r="http://schemas.openxmlformats.org/officeDocument/2006/relationships" xmlns:p="http://schemas.openxmlformats.org/presentationml/2006/main">
+  <p:cSld>
+    <p:spTree>
+      <p:nvGrpSpPr>
+        <p:cNvPr id="1" name=""/>
+        <p:cNvGrpSpPr/>
+        <p:nvPr/>
+      </p:nvGrpSpPr>
+      <p:grpSpPr>
+        <a:xfrm>
+          <a:off x="0" y="0"/>
+          <a:ext cx="0" cy="0"/>
+          <a:chOff x="0" y="0"/>
+          <a:chExt cx="0" cy="0"/>
+        </a:xfrm>
+      </p:grpSpPr>
+      <p:sp>
+        <p:nvSpPr>
+          <p:cNvPr id="2" name="Title 1"/>
+          <p:cNvSpPr>
+            <a:spLocks noGrp="1"/>
+          </p:cNvSpPr>
+          <p:nvPr>
+            <p:ph type="title"/>
+          </p:nvPr>
+        </p:nvSpPr>
+        <p:spPr/>
+        <p:txBody>
+          <a:bodyPr/>
+          <a:lstStyle/>
+          <a:p>
+            <a:r>
+              <a:rPr lang="en-US" dirty="0" smtClean="0"/>
+              <a:t>Data Types Cont.</a:t>
+            </a:r>
+            <a:endParaRPr lang="en-US" dirty="0"/>
+          </a:p>
+        </p:txBody>
+      </p:sp>
+      <p:sp>
+        <p:nvSpPr>
+          <p:cNvPr id="3" name="Content Placeholder 2"/>
+          <p:cNvSpPr>
+            <a:spLocks noGrp="1"/>
+          </p:cNvSpPr>
+          <p:nvPr>
+            <p:ph idx="1"/>
+          </p:nvPr>
+        </p:nvSpPr>
+        <p:spPr/>
+        <p:txBody>
+          <a:bodyPr>
+            <a:normAutofit fontScale="92500"/>
+          </a:bodyPr>
+          <a:lstStyle/>
+          <a:p>
+            <a:r>
+              <a:rPr lang="en-US" sz="2800" dirty="0" smtClean="0"/>
+              <a:t>The compiler needs to know the Data Type before it executes the program</a:t>
+            </a:r>
+          </a:p>
+          <a:p>
+            <a:r>
+              <a:rPr lang="en-US" sz="2800" dirty="0"/>
+              <a:t>Strongly Typed means that when you try and code </a:t>
+            </a:r>
+            <a:r>
+              <a:rPr lang="en-US" sz="2800" dirty="0" smtClean="0"/>
+              <a:t>:</a:t>
+            </a:r>
+          </a:p>
+          <a:p>
+            <a:pPr marL="806450" lvl="2" indent="0">
+              <a:buNone/>
+            </a:pPr>
+            <a:r>
+              <a:rPr lang="en-US" sz="2400" i="1" spc="300" dirty="0">
+                <a:ln w="11430" cmpd="sng">
+                  <a:solidFill>
+                    <a:schemeClr val="accent1">
+                      <a:tint val="10000"/>
+                    </a:schemeClr>
+                  </a:solidFill>
+                  <a:prstDash val="solid"/>
+                  <a:miter lim="800000"/>
+                </a:ln>
+                <a:gradFill>
+                  <a:gsLst>
+                    <a:gs pos="10000">
+                      <a:schemeClr val="accent1">
+                        <a:tint val="83000"/>
+                        <a:shade val="100000"/>
+                        <a:satMod val="200000"/>
+                      </a:schemeClr>
+                    </a:gs>
+                    <a:gs pos="75000">
+                      <a:schemeClr val="accent1">
+                        <a:tint val="100000"/>
+                        <a:shade val="50000"/>
+                        <a:satMod val="150000"/>
+                      </a:schemeClr>
+                    </a:gs>
+                  </a:gsLst>
+                  <a:lin ang="5400000"/>
+                </a:gradFill>
+                <a:effectLst>
+                  <a:glow rad="45500">
+                    <a:schemeClr val="accent1">
+                      <a:satMod val="220000"/>
+                      <a:alpha val="35000"/>
+                    </a:schemeClr>
+                  </a:glow>
+                </a:effectLst>
+                <a:cs typeface="Avenir Black"/>
+              </a:rPr>
+              <a:t>x</a:t>
+            </a:r>
+            <a:r>
+              <a:rPr lang="en-US" sz="2400" i="1" spc="300" dirty="0" smtClean="0">
+                <a:ln w="11430" cmpd="sng">
+                  <a:solidFill>
+                    <a:schemeClr val="accent1">
+                      <a:tint val="10000"/>
+                    </a:schemeClr>
+                  </a:solidFill>
+                  <a:prstDash val="solid"/>
+                  <a:miter lim="800000"/>
+                </a:ln>
+                <a:gradFill>
+                  <a:gsLst>
+                    <a:gs pos="10000">
+                      <a:schemeClr val="accent1">
+                        <a:tint val="83000"/>
+                        <a:shade val="100000"/>
+                        <a:satMod val="200000"/>
+                      </a:schemeClr>
+                    </a:gs>
+                    <a:gs pos="75000">
+                      <a:schemeClr val="accent1">
+                        <a:tint val="100000"/>
+                        <a:shade val="50000"/>
+                        <a:satMod val="150000"/>
+                      </a:schemeClr>
+                    </a:gs>
+                  </a:gsLst>
+                  <a:lin ang="5400000"/>
+                </a:gradFill>
+                <a:effectLst>
+                  <a:glow rad="45500">
+                    <a:schemeClr val="accent1">
+                      <a:satMod val="220000"/>
+                      <a:alpha val="35000"/>
+                    </a:schemeClr>
+                  </a:glow>
+                </a:effectLst>
+                <a:cs typeface="Avenir Black"/>
+              </a:rPr>
+              <a:t> = 1</a:t>
+            </a:r>
+          </a:p>
+          <a:p>
+            <a:pPr marL="806450" lvl="2" indent="0">
+              <a:buNone/>
+            </a:pPr>
+            <a:r>
+              <a:rPr lang="en-US" sz="2400" dirty="0" smtClean="0"/>
+              <a:t>A compilation Error will occur, if not defined earlier</a:t>
+            </a:r>
+          </a:p>
+          <a:p>
+            <a:pPr marL="806450" lvl="2" indent="0">
+              <a:buNone/>
+            </a:pPr>
+            <a:r>
+              <a:rPr lang="en-US" sz="2400" i="1" spc="300" dirty="0" err="1">
+                <a:ln w="11430" cmpd="sng">
+                  <a:solidFill>
+                    <a:schemeClr val="accent1">
+                      <a:tint val="10000"/>
+                    </a:schemeClr>
+                  </a:solidFill>
+                  <a:prstDash val="solid"/>
+                  <a:miter lim="800000"/>
+                </a:ln>
+                <a:gradFill>
+                  <a:gsLst>
+                    <a:gs pos="10000">
+                      <a:schemeClr val="accent1">
+                        <a:tint val="83000"/>
+                        <a:shade val="100000"/>
+                        <a:satMod val="200000"/>
+                      </a:schemeClr>
+                    </a:gs>
+                    <a:gs pos="75000">
+                      <a:schemeClr val="accent1">
+                        <a:tint val="100000"/>
+                        <a:shade val="50000"/>
+                        <a:satMod val="150000"/>
+                      </a:schemeClr>
+                    </a:gs>
+                  </a:gsLst>
+                  <a:lin ang="5400000"/>
+                </a:gradFill>
+                <a:effectLst>
+                  <a:glow rad="45500">
+                    <a:schemeClr val="accent1">
+                      <a:satMod val="220000"/>
+                      <a:alpha val="35000"/>
+                    </a:schemeClr>
+                  </a:glow>
+                </a:effectLst>
+              </a:rPr>
+              <a:t>i</a:t>
+            </a:r>
+            <a:r>
+              <a:rPr lang="en-US" sz="2400" i="1" spc="300" dirty="0" err="1" smtClean="0">
+                <a:ln w="11430" cmpd="sng">
+                  <a:solidFill>
+                    <a:schemeClr val="accent1">
+                      <a:tint val="10000"/>
+                    </a:schemeClr>
+                  </a:solidFill>
+                  <a:prstDash val="solid"/>
+                  <a:miter lim="800000"/>
+                </a:ln>
+                <a:gradFill>
+                  <a:gsLst>
+                    <a:gs pos="10000">
+                      <a:schemeClr val="accent1">
+                        <a:tint val="83000"/>
+                        <a:shade val="100000"/>
+                        <a:satMod val="200000"/>
+                      </a:schemeClr>
+                    </a:gs>
+                    <a:gs pos="75000">
+                      <a:schemeClr val="accent1">
+                        <a:tint val="100000"/>
+                        <a:shade val="50000"/>
+                        <a:satMod val="150000"/>
+                      </a:schemeClr>
+                    </a:gs>
+                  </a:gsLst>
+                  <a:lin ang="5400000"/>
+                </a:gradFill>
+                <a:effectLst>
+                  <a:glow rad="45500">
+                    <a:schemeClr val="accent1">
+                      <a:satMod val="220000"/>
+                      <a:alpha val="35000"/>
+                    </a:schemeClr>
+                  </a:glow>
+                </a:effectLst>
+              </a:rPr>
+              <a:t>nt</a:t>
+            </a:r>
+            <a:r>
+              <a:rPr lang="en-US" sz="2400" i="1" spc="300" dirty="0" smtClean="0">
+                <a:ln w="11430" cmpd="sng">
+                  <a:solidFill>
+                    <a:schemeClr val="accent1">
+                      <a:tint val="10000"/>
+                    </a:schemeClr>
+                  </a:solidFill>
+                  <a:prstDash val="solid"/>
+                  <a:miter lim="800000"/>
+                </a:ln>
+                <a:gradFill>
+                  <a:gsLst>
+                    <a:gs pos="10000">
+                      <a:schemeClr val="accent1">
+                        <a:tint val="83000"/>
+                        <a:shade val="100000"/>
+                        <a:satMod val="200000"/>
+                      </a:schemeClr>
+                    </a:gs>
+                    <a:gs pos="75000">
+                      <a:schemeClr val="accent1">
+                        <a:tint val="100000"/>
+                        <a:shade val="50000"/>
+                        <a:satMod val="150000"/>
+                      </a:schemeClr>
+                    </a:gs>
+                  </a:gsLst>
+                  <a:lin ang="5400000"/>
+                </a:gradFill>
+                <a:effectLst>
+                  <a:glow rad="45500">
+                    <a:schemeClr val="accent1">
+                      <a:satMod val="220000"/>
+                      <a:alpha val="35000"/>
+                    </a:schemeClr>
+                  </a:glow>
+                </a:effectLst>
+              </a:rPr>
+              <a:t> x = 1</a:t>
+            </a:r>
+          </a:p>
+          <a:p>
+            <a:pPr marL="806450" lvl="2" indent="0">
+              <a:buNone/>
+            </a:pPr>
+            <a:r>
+              <a:rPr lang="en-US" sz="2400" dirty="0" smtClean="0"/>
+              <a:t>That’s fine, since now the compiler knows what to do with the value assigned to it</a:t>
+            </a:r>
+            <a:endParaRPr lang="en-US" sz="2800" dirty="0" smtClean="0"/>
+          </a:p>
+          <a:p>
+            <a:pPr marL="806450" lvl="2" indent="0">
+              <a:buNone/>
+            </a:pPr>
+            <a:endParaRPr lang="en-US" sz="2400" dirty="0" smtClean="0"/>
+          </a:p>
+        </p:txBody>
+      </p:sp>
+    </p:spTree>
+    <p:extLst>
+      <p:ext uri="{BB962C8B-B14F-4D97-AF65-F5344CB8AC3E}">
+        <p14:creationId xmlns:p14="http://schemas.microsoft.com/office/powerpoint/2010/main" val="1452481762"/>
+      </p:ext>
+    </p:extLst>
+  </p:cSld>
+  <p:clrMapOvr>
+    <a:masterClrMapping/>
+  </p:clrMapOvr>
+  <p:timing>
+    <p:tnLst>
+      <p:par>
+        <p:cTn xmlns:p14="http://schemas.microsoft.com/office/powerpoint/2010/main" id="1" dur="indefinite" restart="never" nodeType="tmRoot"/>
+      </p:par>
+    </p:tnLst>
+  </p:timing>
+</p:sld>
+</file>
+
+<file path=ppt/slides/slide5.xml><?xml version="1.0" encoding="utf-8"?>
+<p:sld xmlns:a="http://schemas.openxmlformats.org/drawingml/2006/main" xmlns:r="http://schemas.openxmlformats.org/officeDocument/2006/relationships" xmlns:p="http://schemas.openxmlformats.org/presentationml/2006/main">
+  <p:cSld>
+    <p:spTree>
+      <p:nvGrpSpPr>
+        <p:cNvPr id="1" name=""/>
+        <p:cNvGrpSpPr/>
+        <p:nvPr/>
+      </p:nvGrpSpPr>
+      <p:grpSpPr>
+        <a:xfrm>
+          <a:off x="0" y="0"/>
+          <a:ext cx="0" cy="0"/>
+          <a:chOff x="0" y="0"/>
+          <a:chExt cx="0" cy="0"/>
+        </a:xfrm>
+      </p:grpSpPr>
+      <p:sp>
+        <p:nvSpPr>
+          <p:cNvPr id="2" name="Title 1"/>
+          <p:cNvSpPr>
+            <a:spLocks noGrp="1"/>
+          </p:cNvSpPr>
+          <p:nvPr>
+            <p:ph type="title"/>
+          </p:nvPr>
+        </p:nvSpPr>
+        <p:spPr/>
+        <p:txBody>
+          <a:bodyPr/>
+          <a:lstStyle/>
+          <a:p>
+            <a:r>
+              <a:rPr lang="en-US" dirty="0" smtClean="0"/>
+              <a:t>Data Types Cont.</a:t>
+            </a:r>
+            <a:endParaRPr lang="en-US" dirty="0"/>
+          </a:p>
+        </p:txBody>
+      </p:sp>
+      <p:sp>
+        <p:nvSpPr>
+          <p:cNvPr id="3" name="Content Placeholder 2"/>
+          <p:cNvSpPr>
+            <a:spLocks noGrp="1"/>
+          </p:cNvSpPr>
+          <p:nvPr>
+            <p:ph idx="1"/>
+          </p:nvPr>
+        </p:nvSpPr>
+        <p:spPr/>
+        <p:txBody>
+          <a:bodyPr/>
+          <a:lstStyle/>
+          <a:p>
+            <a:r>
+              <a:rPr lang="en-US" dirty="0" smtClean="0"/>
+              <a:t>Size of Data Types</a:t>
+            </a:r>
+          </a:p>
+          <a:p>
+            <a:pPr lvl="1"/>
+            <a:r>
+              <a:rPr lang="en-US" dirty="0" smtClean="0"/>
+              <a:t>Each data type has a certain size associated with it</a:t>
+            </a:r>
+          </a:p>
+          <a:p>
+            <a:pPr lvl="1"/>
+            <a:r>
+              <a:rPr lang="en-US" dirty="0" smtClean="0"/>
+              <a:t>This size is used to determine how much space it “takes up” in memory</a:t>
+            </a:r>
+          </a:p>
+          <a:p>
+            <a:r>
+              <a:rPr lang="en-US" dirty="0" smtClean="0"/>
+              <a:t>Imagine memory as a finite 3-D space. </a:t>
+            </a:r>
+          </a:p>
+          <a:p>
+            <a:pPr lvl="1"/>
+            <a:r>
+              <a:rPr lang="en-US" dirty="0" smtClean="0"/>
+              <a:t>Each variable takes up a part of this space</a:t>
+            </a:r>
+          </a:p>
+          <a:p>
+            <a:pPr lvl="1"/>
+            <a:r>
+              <a:rPr lang="en-US" dirty="0" smtClean="0"/>
+              <a:t>The amount of space it occupies is determined by the data type</a:t>
+            </a:r>
+          </a:p>
+          <a:p>
+            <a:pPr lvl="1"/>
+            <a:r>
+              <a:rPr lang="en-US" dirty="0" smtClean="0"/>
+              <a:t>Two spaces can never be the same</a:t>
+            </a:r>
+          </a:p>
+          <a:p>
+            <a:pPr lvl="1"/>
+            <a:endParaRPr lang="en-US" dirty="0" smtClean="0"/>
+          </a:p>
+          <a:p>
+            <a:pPr lvl="1"/>
+            <a:endParaRPr lang="en-US" dirty="0" smtClean="0"/>
+          </a:p>
+        </p:txBody>
+      </p:sp>
+    </p:spTree>
+    <p:extLst>
+      <p:ext uri="{BB962C8B-B14F-4D97-AF65-F5344CB8AC3E}">
+        <p14:creationId xmlns:p14="http://schemas.microsoft.com/office/powerpoint/2010/main" val="2374409598"/>
+      </p:ext>
+    </p:extLst>
+  </p:cSld>
+  <p:clrMapOvr>
+    <a:masterClrMapping/>
+  </p:clrMapOvr>
+  <p:timing>
+    <p:tnLst>
+      <p:par>
+        <p:cTn xmlns:p14="http://schemas.microsoft.com/office/powerpoint/2010/main" id="1" dur="indefinite" restart="never" nodeType="tmRoot"/>
+      </p:par>
+    </p:tnLst>
+  </p:timing>
+</p:sld>
+</file>
+
+<file path=ppt/slides/slide6.xml><?xml version="1.0" encoding="utf-8"?>
+<p:sld xmlns:a="http://schemas.openxmlformats.org/drawingml/2006/main" xmlns:r="http://schemas.openxmlformats.org/officeDocument/2006/relationships" xmlns:p="http://schemas.openxmlformats.org/presentationml/2006/main">
+  <p:cSld>
+    <p:spTree>
+      <p:nvGrpSpPr>
+        <p:cNvPr id="1" name=""/>
+        <p:cNvGrpSpPr/>
+        <p:nvPr/>
+      </p:nvGrpSpPr>
+      <p:grpSpPr>
+        <a:xfrm>
+          <a:off x="0" y="0"/>
+          <a:ext cx="0" cy="0"/>
+          <a:chOff x="0" y="0"/>
+          <a:chExt cx="0" cy="0"/>
+        </a:xfrm>
+      </p:grpSpPr>
+      <p:sp>
+        <p:nvSpPr>
+          <p:cNvPr id="2" name="Title 1"/>
+          <p:cNvSpPr>
+            <a:spLocks noGrp="1"/>
+          </p:cNvSpPr>
+          <p:nvPr>
+            <p:ph type="title"/>
+          </p:nvPr>
+        </p:nvSpPr>
+        <p:spPr/>
+        <p:txBody>
+          <a:bodyPr/>
+          <a:lstStyle/>
+          <a:p>
+            <a:r>
+              <a:rPr lang="en-US" dirty="0" smtClean="0"/>
+              <a:t>Data Types Cont.</a:t>
+            </a:r>
+            <a:endParaRPr lang="en-US" dirty="0"/>
+          </a:p>
+        </p:txBody>
+      </p:sp>
+      <p:pic>
+        <p:nvPicPr>
+          <p:cNvPr id="5" name="Picture 4"/>
+          <p:cNvPicPr>
+            <a:picLocks noChangeAspect="1"/>
+          </p:cNvPicPr>
+          <p:nvPr/>
+        </p:nvPicPr>
+        <p:blipFill>
+          <a:blip r:embed="rId2"/>
+          <a:stretch>
+            <a:fillRect/>
+          </a:stretch>
+        </p:blipFill>
+        <p:spPr>
+          <a:xfrm>
+            <a:off x="1130099" y="1470523"/>
+            <a:ext cx="6837480" cy="4909311"/>
+          </a:xfrm>
+          <a:prstGeom prst="rect">
+            <a:avLst/>
+          </a:prstGeom>
+        </p:spPr>
+      </p:pic>
+    </p:spTree>
+    <p:extLst>
+      <p:ext uri="{BB962C8B-B14F-4D97-AF65-F5344CB8AC3E}">
+        <p14:creationId xmlns:p14="http://schemas.microsoft.com/office/powerpoint/2010/main" val="2692838940"/>
+      </p:ext>
+    </p:extLst>
+  </p:cSld>
+  <p:clrMapOvr>
+    <a:masterClrMapping/>
+  </p:clrMapOvr>
+  <p:timing>
+    <p:tnLst>
+      <p:par>
+        <p:cTn xmlns:p14="http://schemas.microsoft.com/office/powerpoint/2010/main" id="1" dur="indefinite" restart="never" nodeType="tmRoot"/>
+      </p:par>
+    </p:tnLst>
+  </p:timing>
+</p:sld>
+</file>
+
+<file path=ppt/slides/slide7.xml><?xml version="1.0" encoding="utf-8"?>
+<p:sld xmlns:a="http://schemas.openxmlformats.org/drawingml/2006/main" xmlns:r="http://schemas.openxmlformats.org/officeDocument/2006/relationships" xmlns:p="http://schemas.openxmlformats.org/presentationml/2006/main">
+  <p:cSld>
+    <p:spTree>
+      <p:nvGrpSpPr>
+        <p:cNvPr id="1" name=""/>
+        <p:cNvGrpSpPr/>
+        <p:nvPr/>
+      </p:nvGrpSpPr>
+      <p:grpSpPr>
+        <a:xfrm>
+          <a:off x="0" y="0"/>
+          <a:ext cx="0" cy="0"/>
+          <a:chOff x="0" y="0"/>
+          <a:chExt cx="0" cy="0"/>
+        </a:xfrm>
+      </p:grpSpPr>
+      <p:sp>
+        <p:nvSpPr>
+          <p:cNvPr id="2" name="Title 1"/>
+          <p:cNvSpPr>
+            <a:spLocks noGrp="1"/>
+          </p:cNvSpPr>
+          <p:nvPr>
+            <p:ph type="title"/>
+          </p:nvPr>
+        </p:nvSpPr>
+        <p:spPr/>
+        <p:txBody>
+          <a:bodyPr/>
+          <a:lstStyle/>
+          <a:p>
+            <a:r>
+              <a:rPr lang="en-US" dirty="0" smtClean="0"/>
+              <a:t>Data Types Cont.</a:t>
+            </a:r>
+            <a:endParaRPr lang="en-US" dirty="0"/>
+          </a:p>
+        </p:txBody>
+      </p:sp>
+      <p:sp>
+        <p:nvSpPr>
+          <p:cNvPr id="3" name="Content Placeholder 2"/>
+          <p:cNvSpPr>
+            <a:spLocks noGrp="1"/>
+          </p:cNvSpPr>
+          <p:nvPr>
+            <p:ph idx="1"/>
+          </p:nvPr>
+        </p:nvSpPr>
+        <p:spPr/>
+        <p:txBody>
+          <a:bodyPr>
+            <a:normAutofit lnSpcReduction="10000"/>
+          </a:bodyPr>
+          <a:lstStyle/>
+          <a:p>
+            <a:r>
+              <a:rPr lang="en-US" dirty="0" smtClean="0"/>
+              <a:t>Representation</a:t>
+            </a:r>
+          </a:p>
+          <a:p>
+            <a:pPr lvl="1"/>
+            <a:r>
+              <a:rPr lang="en-US" dirty="0" smtClean="0"/>
+              <a:t>As I am sure you know, at the very lowest level, all data is represented by sequences of </a:t>
+            </a:r>
+            <a:r>
+              <a:rPr lang="en-US" dirty="0"/>
+              <a:t>binary</a:t>
+            </a:r>
+            <a:r>
+              <a:rPr lang="en-US" dirty="0" smtClean="0"/>
+              <a:t> digits.</a:t>
+            </a:r>
+          </a:p>
+          <a:p>
+            <a:pPr lvl="1"/>
+            <a:r>
+              <a:rPr lang="en-US" dirty="0" smtClean="0"/>
+              <a:t>That is, all data types are in a sense the same thing. They are just used differently.</a:t>
+            </a:r>
+          </a:p>
+          <a:p>
+            <a:r>
+              <a:rPr lang="en-US" dirty="0" smtClean="0"/>
+              <a:t>For interest sake:</a:t>
+            </a:r>
+          </a:p>
+          <a:p>
+            <a:pPr lvl="1"/>
+            <a:r>
+              <a:rPr lang="en-US" dirty="0" smtClean="0"/>
+              <a:t>We use the decimal system (base 10)</a:t>
+            </a:r>
+          </a:p>
+          <a:p>
+            <a:pPr lvl="1"/>
+            <a:r>
+              <a:rPr lang="en-US" dirty="0" smtClean="0"/>
+              <a:t>The binary system is base 2</a:t>
+            </a:r>
+          </a:p>
+          <a:p>
+            <a:pPr lvl="1"/>
+            <a:r>
+              <a:rPr lang="en-US" dirty="0" smtClean="0"/>
+              <a:t>Hexadecimal is base 16 (normally represented with a 0X prefix)</a:t>
+            </a:r>
+          </a:p>
+        </p:txBody>
+      </p:sp>
+    </p:spTree>
+    <p:extLst>
+      <p:ext uri="{BB962C8B-B14F-4D97-AF65-F5344CB8AC3E}">
+        <p14:creationId xmlns:p14="http://schemas.microsoft.com/office/powerpoint/2010/main" val="4288018469"/>
+      </p:ext>
+    </p:extLst>
+  </p:cSld>
+  <p:clrMapOvr>
+    <a:masterClrMapping/>
+  </p:clrMapOvr>
+  <p:timing>
+    <p:tnLst>
+      <p:par>
+        <p:cTn xmlns:p14="http://schemas.microsoft.com/office/powerpoint/2010/main" id="1" dur="indefinite" restart="never" nodeType="tmRoot"/>
+      </p:par>
+    </p:tnLst>
+  </p:timing>
+</p:sld>
+</file>
+
+<file path=ppt/slides/slide8.xml><?xml version="1.0" encoding="utf-8"?>
+<p:sld xmlns:a="http://schemas.openxmlformats.org/drawingml/2006/main" xmlns:r="http://schemas.openxmlformats.org/officeDocument/2006/relationships" xmlns:p="http://schemas.openxmlformats.org/presentationml/2006/main">
+  <p:cSld>
+    <p:spTree>
+      <p:nvGrpSpPr>
+        <p:cNvPr id="1" name=""/>
+        <p:cNvGrpSpPr/>
+        <p:nvPr/>
+      </p:nvGrpSpPr>
+      <p:grpSpPr>
+        <a:xfrm>
+          <a:off x="0" y="0"/>
+          <a:ext cx="0" cy="0"/>
+          <a:chOff x="0" y="0"/>
+          <a:chExt cx="0" cy="0"/>
+        </a:xfrm>
+      </p:grpSpPr>
+      <p:sp>
+        <p:nvSpPr>
+          <p:cNvPr id="2" name="Title 1"/>
+          <p:cNvSpPr>
+            <a:spLocks noGrp="1"/>
+          </p:cNvSpPr>
+          <p:nvPr>
+            <p:ph type="title"/>
+          </p:nvPr>
+        </p:nvSpPr>
+        <p:spPr/>
+        <p:txBody>
+          <a:bodyPr/>
+          <a:lstStyle/>
+          <a:p>
+            <a:r>
+              <a:rPr lang="en-US" dirty="0" smtClean="0"/>
+              <a:t>Pointers</a:t>
+            </a:r>
+            <a:endParaRPr lang="en-US" dirty="0"/>
+          </a:p>
+        </p:txBody>
+      </p:sp>
+      <p:sp>
+        <p:nvSpPr>
+          <p:cNvPr id="3" name="Content Placeholder 2"/>
+          <p:cNvSpPr>
+            <a:spLocks noGrp="1"/>
+          </p:cNvSpPr>
+          <p:nvPr>
+            <p:ph idx="1"/>
+          </p:nvPr>
+        </p:nvSpPr>
+        <p:spPr>
+          <a:xfrm>
+            <a:off x="779462" y="1882587"/>
+            <a:ext cx="7581901" cy="4387201"/>
+          </a:xfrm>
+        </p:spPr>
+        <p:txBody>
+          <a:bodyPr>
+            <a:normAutofit/>
+          </a:bodyPr>
+          <a:lstStyle/>
+          <a:p>
+            <a:r>
+              <a:rPr lang="en-US" dirty="0" smtClean="0"/>
+              <a:t>Pointers in C++ can become very complex, and quite literally an interconnected maize of references. Be careful with them! Treat them with care and they won’t kill your program.</a:t>
+            </a:r>
+          </a:p>
+          <a:p>
+            <a:r>
+              <a:rPr lang="en-US" dirty="0" smtClean="0"/>
+              <a:t>What are pointers?</a:t>
+            </a:r>
+          </a:p>
+          <a:p>
+            <a:r>
+              <a:rPr lang="en-US" dirty="0" smtClean="0"/>
+              <a:t>Why do we need pointers?</a:t>
+            </a:r>
+          </a:p>
+          <a:p>
+            <a:r>
+              <a:rPr lang="en-US" dirty="0" smtClean="0"/>
+              <a:t>How do I use pointers?</a:t>
+            </a:r>
+          </a:p>
+          <a:p>
+            <a:r>
+              <a:rPr lang="en-US" dirty="0" smtClean="0"/>
+              <a:t>The good news and the bad news</a:t>
+            </a:r>
+            <a:endParaRPr lang="en-US" dirty="0"/>
+          </a:p>
+        </p:txBody>
+      </p:sp>
+    </p:spTree>
+    <p:extLst>
+      <p:ext uri="{BB962C8B-B14F-4D97-AF65-F5344CB8AC3E}">
+        <p14:creationId xmlns:p14="http://schemas.microsoft.com/office/powerpoint/2010/main" val="2275310738"/>
+      </p:ext>
+    </p:extLst>
+  </p:cSld>
+  <p:clrMapOvr>
+    <a:masterClrMapping/>
+  </p:clrMapOvr>
+  <p:timing>
+    <p:tnLst>
+      <p:par>
+        <p:cTn xmlns:p14="http://schemas.microsoft.com/office/powerpoint/2010/main" id="1" dur="indefinite" restart="never" nodeType="tmRoot"/>
+      </p:par>
+    </p:tnLst>
+  </p:timing>
+</p:sld>
+</file>
+
+<file path=ppt/slides/slide9.xml><?xml version="1.0" encoding="utf-8"?>
+<p:sld xmlns:a="http://schemas.openxmlformats.org/drawingml/2006/main" xmlns:r="http://schemas.openxmlformats.org/officeDocument/2006/relationships" xmlns:p="http://schemas.openxmlformats.org/presentationml/2006/main">
+  <p:cSld>
+    <p:spTree>
+      <p:nvGrpSpPr>
+        <p:cNvPr id="1" name=""/>
+        <p:cNvGrpSpPr/>
+        <p:nvPr/>
+      </p:nvGrpSpPr>
+      <p:grpSpPr>
+        <a:xfrm>
+          <a:off x="0" y="0"/>
+          <a:ext cx="0" cy="0"/>
+          <a:chOff x="0" y="0"/>
+          <a:chExt cx="0" cy="0"/>
+        </a:xfrm>
+      </p:grpSpPr>
+      <p:sp>
+        <p:nvSpPr>
+          <p:cNvPr id="2" name="Title 1"/>
+          <p:cNvSpPr>
+            <a:spLocks noGrp="1"/>
+          </p:cNvSpPr>
+          <p:nvPr>
+            <p:ph type="title"/>
+          </p:nvPr>
+        </p:nvSpPr>
+        <p:spPr/>
+        <p:txBody>
+          <a:bodyPr/>
+          <a:lstStyle/>
+          <a:p>
+            <a:r>
+              <a:rPr lang="en-US" dirty="0" smtClean="0"/>
+              <a:t>Pointers Cont.</a:t>
+            </a:r>
+            <a:endParaRPr lang="en-US" dirty="0"/>
+          </a:p>
+        </p:txBody>
+      </p:sp>
+      <p:sp>
+        <p:nvSpPr>
+          <p:cNvPr id="3" name="Content Placeholder 2"/>
+          <p:cNvSpPr>
+            <a:spLocks noGrp="1"/>
+          </p:cNvSpPr>
+          <p:nvPr>
+            <p:ph idx="1"/>
+          </p:nvPr>
+        </p:nvSpPr>
+        <p:spPr/>
+        <p:txBody>
+          <a:bodyPr/>
+          <a:lstStyle/>
+          <a:p>
+            <a:r>
+              <a:rPr lang="en-US" dirty="0" smtClean="0"/>
+              <a:t>What are pointers?</a:t>
+            </a:r>
+          </a:p>
+          <a:p>
+            <a:pPr lvl="1"/>
+            <a:r>
+              <a:rPr lang="en-US" dirty="0" smtClean="0"/>
+              <a:t>Remember the finite 3D space where we put our variables in earlier? (i.e. memory)</a:t>
+            </a:r>
+          </a:p>
+          <a:p>
+            <a:pPr lvl="1"/>
+            <a:r>
+              <a:rPr lang="en-US" dirty="0" smtClean="0"/>
+              <a:t>A pointer is yet another data type</a:t>
+            </a:r>
+          </a:p>
+          <a:p>
+            <a:pPr lvl="1"/>
+            <a:r>
+              <a:rPr lang="en-US" dirty="0" smtClean="0"/>
+              <a:t>A pointer is simply a “reference”</a:t>
+            </a:r>
+          </a:p>
+          <a:p>
+            <a:pPr lvl="1"/>
+            <a:r>
+              <a:rPr lang="en-US" dirty="0" smtClean="0"/>
+              <a:t>What is meant by “reference”?</a:t>
+            </a:r>
+          </a:p>
+          <a:p>
+            <a:pPr lvl="2"/>
+            <a:r>
+              <a:rPr lang="en-US" dirty="0" smtClean="0"/>
+              <a:t>A reference is something that tells you where to find “something” in the 3D space</a:t>
+            </a:r>
+          </a:p>
+          <a:p>
+            <a:pPr lvl="1"/>
+            <a:r>
+              <a:rPr lang="en-US" dirty="0" smtClean="0"/>
+              <a:t>Since a pointer is just a reference, all pointers have the same size. See </a:t>
+            </a:r>
+            <a:r>
+              <a:rPr lang="en-US" i="1" dirty="0" err="1" smtClean="0">
+                <a:latin typeface="Apple Chancery"/>
+                <a:cs typeface="Apple Chancery"/>
+              </a:rPr>
+              <a:t>ArrayDT.cpp</a:t>
+            </a:r>
+            <a:endParaRPr lang="en-US" i="1" dirty="0" smtClean="0">
+              <a:latin typeface="Apple Chancery"/>
+              <a:cs typeface="Apple Chancery"/>
+            </a:endParaRPr>
+          </a:p>
+        </p:txBody>
+      </p:sp>
+    </p:spTree>
+    <p:extLst>
+      <p:ext uri="{BB962C8B-B14F-4D97-AF65-F5344CB8AC3E}">
+        <p14:creationId xmlns:p14="http://schemas.microsoft.com/office/powerpoint/2010/main" val="354998380"/>
+      </p:ext>
+    </p:extLst>
+  </p:cSld>
+  <p:clrMapOvr>
+    <a:masterClrMapping/>
+  </p:clrMapOvr>
+  <p:timing>
+    <p:tnLst>
+      <p:par>
+        <p:cTn xmlns:p14="http://schemas.microsoft.com/office/powerpoint/2010/main" id="1" dur="indefinite" restart="never" nodeType="tmRoot"/>
+      </p:par>
+    </p:tnLst>
+  </p:timing>
 </p:sld>
 </file>
 

</xml_diff>